<commit_message>
Edge tutorial in Chinese
</commit_message>
<xml_diff>
--- a/media/edge.pptx
+++ b/media/edge.pptx
@@ -5,10 +5,10 @@
     <p:sldMasterId id="2147483743" r:id="rId1"/>
   </p:sldMasterIdLst>
   <p:notesMasterIdLst>
-    <p:notesMasterId r:id="rId10"/>
+    <p:notesMasterId r:id="rId11"/>
   </p:notesMasterIdLst>
   <p:handoutMasterIdLst>
-    <p:handoutMasterId r:id="rId11"/>
+    <p:handoutMasterId r:id="rId12"/>
   </p:handoutMasterIdLst>
   <p:sldIdLst>
     <p:sldId id="318" r:id="rId2"/>
@@ -19,6 +19,7 @@
     <p:sldId id="322" r:id="rId7"/>
     <p:sldId id="323" r:id="rId8"/>
     <p:sldId id="324" r:id="rId9"/>
+    <p:sldId id="328" r:id="rId10"/>
   </p:sldIdLst>
   <p:sldSz cx="12192000" cy="6858000"/>
   <p:notesSz cx="6858000" cy="9144000"/>
@@ -210,7 +211,7 @@
           <a:p>
             <a:fld id="{47277FB0-21EC-48C5-90B0-184600466A6C}" type="datetimeFigureOut">
               <a:rPr lang="zh-CN" altLang="en-US" smtClean="0"/>
-              <a:t>2019/8/26</a:t>
+              <a:t>2019/10/12</a:t>
             </a:fld>
             <a:endParaRPr lang="zh-CN" altLang="en-US"/>
           </a:p>
@@ -375,7 +376,7 @@
           <a:p>
             <a:fld id="{9C967889-4715-5C4F-A252-FFC716185AB6}" type="datetimeFigureOut">
               <a:rPr lang="en-US" smtClean="0"/>
-              <a:t>8/26/19</a:t>
+              <a:t>10/12/2019</a:t>
             </a:fld>
             <a:endParaRPr lang="en-US"/>
           </a:p>
@@ -19758,6 +19759,2784 @@
 </p:sld>
 </file>
 
+<file path=ppt/slides/slide9.xml><?xml version="1.0" encoding="utf-8"?>
+<p:sld xmlns:a="http://schemas.openxmlformats.org/drawingml/2006/main" xmlns:r="http://schemas.openxmlformats.org/officeDocument/2006/relationships" xmlns:p="http://schemas.openxmlformats.org/presentationml/2006/main">
+  <p:cSld>
+    <p:spTree>
+      <p:nvGrpSpPr>
+        <p:cNvPr id="1" name=""/>
+        <p:cNvGrpSpPr/>
+        <p:nvPr/>
+      </p:nvGrpSpPr>
+      <p:grpSpPr>
+        <a:xfrm>
+          <a:off x="0" y="0"/>
+          <a:ext cx="0" cy="0"/>
+          <a:chOff x="0" y="0"/>
+          <a:chExt cx="0" cy="0"/>
+        </a:xfrm>
+      </p:grpSpPr>
+      <p:sp>
+        <p:nvSpPr>
+          <p:cNvPr id="5" name="Freeform 65">
+            <a:extLst>
+              <a:ext uri="{FF2B5EF4-FFF2-40B4-BE49-F238E27FC236}">
+                <a16:creationId xmlns:a16="http://schemas.microsoft.com/office/drawing/2014/main" id="{E63A234E-E6AA-4850-8B2F-832D2151BA94}"/>
+              </a:ext>
+            </a:extLst>
+          </p:cNvPr>
+          <p:cNvSpPr>
+            <a:spLocks noEditPoints="1"/>
+          </p:cNvSpPr>
+          <p:nvPr/>
+        </p:nvSpPr>
+        <p:spPr bwMode="auto">
+          <a:xfrm>
+            <a:off x="5519426" y="2626535"/>
+            <a:ext cx="988555" cy="756745"/>
+          </a:xfrm>
+          <a:custGeom>
+            <a:avLst/>
+            <a:gdLst>
+              <a:gd name="T0" fmla="*/ 179 w 661"/>
+              <a:gd name="T1" fmla="*/ 397 h 506"/>
+              <a:gd name="T2" fmla="*/ 144 w 661"/>
+              <a:gd name="T3" fmla="*/ 397 h 506"/>
+              <a:gd name="T4" fmla="*/ 144 w 661"/>
+              <a:gd name="T5" fmla="*/ 433 h 506"/>
+              <a:gd name="T6" fmla="*/ 179 w 661"/>
+              <a:gd name="T7" fmla="*/ 433 h 506"/>
+              <a:gd name="T8" fmla="*/ 179 w 661"/>
+              <a:gd name="T9" fmla="*/ 397 h 506"/>
+              <a:gd name="T10" fmla="*/ 108 w 661"/>
+              <a:gd name="T11" fmla="*/ 324 h 506"/>
+              <a:gd name="T12" fmla="*/ 70 w 661"/>
+              <a:gd name="T13" fmla="*/ 324 h 506"/>
+              <a:gd name="T14" fmla="*/ 70 w 661"/>
+              <a:gd name="T15" fmla="*/ 362 h 506"/>
+              <a:gd name="T16" fmla="*/ 108 w 661"/>
+              <a:gd name="T17" fmla="*/ 362 h 506"/>
+              <a:gd name="T18" fmla="*/ 108 w 661"/>
+              <a:gd name="T19" fmla="*/ 324 h 506"/>
+              <a:gd name="T20" fmla="*/ 108 w 661"/>
+              <a:gd name="T21" fmla="*/ 397 h 506"/>
+              <a:gd name="T22" fmla="*/ 70 w 661"/>
+              <a:gd name="T23" fmla="*/ 397 h 506"/>
+              <a:gd name="T24" fmla="*/ 70 w 661"/>
+              <a:gd name="T25" fmla="*/ 433 h 506"/>
+              <a:gd name="T26" fmla="*/ 108 w 661"/>
+              <a:gd name="T27" fmla="*/ 433 h 506"/>
+              <a:gd name="T28" fmla="*/ 108 w 661"/>
+              <a:gd name="T29" fmla="*/ 397 h 506"/>
+              <a:gd name="T30" fmla="*/ 250 w 661"/>
+              <a:gd name="T31" fmla="*/ 397 h 506"/>
+              <a:gd name="T32" fmla="*/ 215 w 661"/>
+              <a:gd name="T33" fmla="*/ 397 h 506"/>
+              <a:gd name="T34" fmla="*/ 215 w 661"/>
+              <a:gd name="T35" fmla="*/ 433 h 506"/>
+              <a:gd name="T36" fmla="*/ 250 w 661"/>
+              <a:gd name="T37" fmla="*/ 433 h 506"/>
+              <a:gd name="T38" fmla="*/ 250 w 661"/>
+              <a:gd name="T39" fmla="*/ 397 h 506"/>
+              <a:gd name="T40" fmla="*/ 179 w 661"/>
+              <a:gd name="T41" fmla="*/ 324 h 506"/>
+              <a:gd name="T42" fmla="*/ 144 w 661"/>
+              <a:gd name="T43" fmla="*/ 324 h 506"/>
+              <a:gd name="T44" fmla="*/ 144 w 661"/>
+              <a:gd name="T45" fmla="*/ 362 h 506"/>
+              <a:gd name="T46" fmla="*/ 179 w 661"/>
+              <a:gd name="T47" fmla="*/ 362 h 506"/>
+              <a:gd name="T48" fmla="*/ 179 w 661"/>
+              <a:gd name="T49" fmla="*/ 324 h 506"/>
+              <a:gd name="T50" fmla="*/ 576 w 661"/>
+              <a:gd name="T51" fmla="*/ 352 h 506"/>
+              <a:gd name="T52" fmla="*/ 432 w 661"/>
+              <a:gd name="T53" fmla="*/ 352 h 506"/>
+              <a:gd name="T54" fmla="*/ 432 w 661"/>
+              <a:gd name="T55" fmla="*/ 407 h 506"/>
+              <a:gd name="T56" fmla="*/ 576 w 661"/>
+              <a:gd name="T57" fmla="*/ 407 h 506"/>
+              <a:gd name="T58" fmla="*/ 576 w 661"/>
+              <a:gd name="T59" fmla="*/ 352 h 506"/>
+              <a:gd name="T60" fmla="*/ 661 w 661"/>
+              <a:gd name="T61" fmla="*/ 253 h 506"/>
+              <a:gd name="T62" fmla="*/ 661 w 661"/>
+              <a:gd name="T63" fmla="*/ 253 h 506"/>
+              <a:gd name="T64" fmla="*/ 543 w 661"/>
+              <a:gd name="T65" fmla="*/ 0 h 506"/>
+              <a:gd name="T66" fmla="*/ 115 w 661"/>
+              <a:gd name="T67" fmla="*/ 0 h 506"/>
+              <a:gd name="T68" fmla="*/ 0 w 661"/>
+              <a:gd name="T69" fmla="*/ 253 h 506"/>
+              <a:gd name="T70" fmla="*/ 0 w 661"/>
+              <a:gd name="T71" fmla="*/ 253 h 506"/>
+              <a:gd name="T72" fmla="*/ 0 w 661"/>
+              <a:gd name="T73" fmla="*/ 506 h 506"/>
+              <a:gd name="T74" fmla="*/ 661 w 661"/>
+              <a:gd name="T75" fmla="*/ 506 h 506"/>
+              <a:gd name="T76" fmla="*/ 661 w 661"/>
+              <a:gd name="T77" fmla="*/ 506 h 506"/>
+              <a:gd name="T78" fmla="*/ 661 w 661"/>
+              <a:gd name="T79" fmla="*/ 506 h 506"/>
+              <a:gd name="T80" fmla="*/ 661 w 661"/>
+              <a:gd name="T81" fmla="*/ 253 h 506"/>
+              <a:gd name="T82" fmla="*/ 661 w 661"/>
+              <a:gd name="T83" fmla="*/ 253 h 506"/>
+              <a:gd name="T84" fmla="*/ 626 w 661"/>
+              <a:gd name="T85" fmla="*/ 468 h 506"/>
+              <a:gd name="T86" fmla="*/ 35 w 661"/>
+              <a:gd name="T87" fmla="*/ 468 h 506"/>
+              <a:gd name="T88" fmla="*/ 35 w 661"/>
+              <a:gd name="T89" fmla="*/ 288 h 506"/>
+              <a:gd name="T90" fmla="*/ 626 w 661"/>
+              <a:gd name="T91" fmla="*/ 288 h 506"/>
+              <a:gd name="T92" fmla="*/ 626 w 661"/>
+              <a:gd name="T93" fmla="*/ 468 h 506"/>
+              <a:gd name="T94" fmla="*/ 323 w 661"/>
+              <a:gd name="T95" fmla="*/ 324 h 506"/>
+              <a:gd name="T96" fmla="*/ 288 w 661"/>
+              <a:gd name="T97" fmla="*/ 324 h 506"/>
+              <a:gd name="T98" fmla="*/ 288 w 661"/>
+              <a:gd name="T99" fmla="*/ 362 h 506"/>
+              <a:gd name="T100" fmla="*/ 323 w 661"/>
+              <a:gd name="T101" fmla="*/ 362 h 506"/>
+              <a:gd name="T102" fmla="*/ 323 w 661"/>
+              <a:gd name="T103" fmla="*/ 324 h 506"/>
+              <a:gd name="T104" fmla="*/ 323 w 661"/>
+              <a:gd name="T105" fmla="*/ 397 h 506"/>
+              <a:gd name="T106" fmla="*/ 288 w 661"/>
+              <a:gd name="T107" fmla="*/ 397 h 506"/>
+              <a:gd name="T108" fmla="*/ 288 w 661"/>
+              <a:gd name="T109" fmla="*/ 433 h 506"/>
+              <a:gd name="T110" fmla="*/ 323 w 661"/>
+              <a:gd name="T111" fmla="*/ 433 h 506"/>
+              <a:gd name="T112" fmla="*/ 323 w 661"/>
+              <a:gd name="T113" fmla="*/ 397 h 506"/>
+              <a:gd name="T114" fmla="*/ 250 w 661"/>
+              <a:gd name="T115" fmla="*/ 324 h 506"/>
+              <a:gd name="T116" fmla="*/ 215 w 661"/>
+              <a:gd name="T117" fmla="*/ 324 h 506"/>
+              <a:gd name="T118" fmla="*/ 215 w 661"/>
+              <a:gd name="T119" fmla="*/ 362 h 506"/>
+              <a:gd name="T120" fmla="*/ 250 w 661"/>
+              <a:gd name="T121" fmla="*/ 362 h 506"/>
+              <a:gd name="T122" fmla="*/ 250 w 661"/>
+              <a:gd name="T123" fmla="*/ 324 h 506"/>
+            </a:gdLst>
+            <a:ahLst/>
+            <a:cxnLst>
+              <a:cxn ang="0">
+                <a:pos x="T0" y="T1"/>
+              </a:cxn>
+              <a:cxn ang="0">
+                <a:pos x="T2" y="T3"/>
+              </a:cxn>
+              <a:cxn ang="0">
+                <a:pos x="T4" y="T5"/>
+              </a:cxn>
+              <a:cxn ang="0">
+                <a:pos x="T6" y="T7"/>
+              </a:cxn>
+              <a:cxn ang="0">
+                <a:pos x="T8" y="T9"/>
+              </a:cxn>
+              <a:cxn ang="0">
+                <a:pos x="T10" y="T11"/>
+              </a:cxn>
+              <a:cxn ang="0">
+                <a:pos x="T12" y="T13"/>
+              </a:cxn>
+              <a:cxn ang="0">
+                <a:pos x="T14" y="T15"/>
+              </a:cxn>
+              <a:cxn ang="0">
+                <a:pos x="T16" y="T17"/>
+              </a:cxn>
+              <a:cxn ang="0">
+                <a:pos x="T18" y="T19"/>
+              </a:cxn>
+              <a:cxn ang="0">
+                <a:pos x="T20" y="T21"/>
+              </a:cxn>
+              <a:cxn ang="0">
+                <a:pos x="T22" y="T23"/>
+              </a:cxn>
+              <a:cxn ang="0">
+                <a:pos x="T24" y="T25"/>
+              </a:cxn>
+              <a:cxn ang="0">
+                <a:pos x="T26" y="T27"/>
+              </a:cxn>
+              <a:cxn ang="0">
+                <a:pos x="T28" y="T29"/>
+              </a:cxn>
+              <a:cxn ang="0">
+                <a:pos x="T30" y="T31"/>
+              </a:cxn>
+              <a:cxn ang="0">
+                <a:pos x="T32" y="T33"/>
+              </a:cxn>
+              <a:cxn ang="0">
+                <a:pos x="T34" y="T35"/>
+              </a:cxn>
+              <a:cxn ang="0">
+                <a:pos x="T36" y="T37"/>
+              </a:cxn>
+              <a:cxn ang="0">
+                <a:pos x="T38" y="T39"/>
+              </a:cxn>
+              <a:cxn ang="0">
+                <a:pos x="T40" y="T41"/>
+              </a:cxn>
+              <a:cxn ang="0">
+                <a:pos x="T42" y="T43"/>
+              </a:cxn>
+              <a:cxn ang="0">
+                <a:pos x="T44" y="T45"/>
+              </a:cxn>
+              <a:cxn ang="0">
+                <a:pos x="T46" y="T47"/>
+              </a:cxn>
+              <a:cxn ang="0">
+                <a:pos x="T48" y="T49"/>
+              </a:cxn>
+              <a:cxn ang="0">
+                <a:pos x="T50" y="T51"/>
+              </a:cxn>
+              <a:cxn ang="0">
+                <a:pos x="T52" y="T53"/>
+              </a:cxn>
+              <a:cxn ang="0">
+                <a:pos x="T54" y="T55"/>
+              </a:cxn>
+              <a:cxn ang="0">
+                <a:pos x="T56" y="T57"/>
+              </a:cxn>
+              <a:cxn ang="0">
+                <a:pos x="T58" y="T59"/>
+              </a:cxn>
+              <a:cxn ang="0">
+                <a:pos x="T60" y="T61"/>
+              </a:cxn>
+              <a:cxn ang="0">
+                <a:pos x="T62" y="T63"/>
+              </a:cxn>
+              <a:cxn ang="0">
+                <a:pos x="T64" y="T65"/>
+              </a:cxn>
+              <a:cxn ang="0">
+                <a:pos x="T66" y="T67"/>
+              </a:cxn>
+              <a:cxn ang="0">
+                <a:pos x="T68" y="T69"/>
+              </a:cxn>
+              <a:cxn ang="0">
+                <a:pos x="T70" y="T71"/>
+              </a:cxn>
+              <a:cxn ang="0">
+                <a:pos x="T72" y="T73"/>
+              </a:cxn>
+              <a:cxn ang="0">
+                <a:pos x="T74" y="T75"/>
+              </a:cxn>
+              <a:cxn ang="0">
+                <a:pos x="T76" y="T77"/>
+              </a:cxn>
+              <a:cxn ang="0">
+                <a:pos x="T78" y="T79"/>
+              </a:cxn>
+              <a:cxn ang="0">
+                <a:pos x="T80" y="T81"/>
+              </a:cxn>
+              <a:cxn ang="0">
+                <a:pos x="T82" y="T83"/>
+              </a:cxn>
+              <a:cxn ang="0">
+                <a:pos x="T84" y="T85"/>
+              </a:cxn>
+              <a:cxn ang="0">
+                <a:pos x="T86" y="T87"/>
+              </a:cxn>
+              <a:cxn ang="0">
+                <a:pos x="T88" y="T89"/>
+              </a:cxn>
+              <a:cxn ang="0">
+                <a:pos x="T90" y="T91"/>
+              </a:cxn>
+              <a:cxn ang="0">
+                <a:pos x="T92" y="T93"/>
+              </a:cxn>
+              <a:cxn ang="0">
+                <a:pos x="T94" y="T95"/>
+              </a:cxn>
+              <a:cxn ang="0">
+                <a:pos x="T96" y="T97"/>
+              </a:cxn>
+              <a:cxn ang="0">
+                <a:pos x="T98" y="T99"/>
+              </a:cxn>
+              <a:cxn ang="0">
+                <a:pos x="T100" y="T101"/>
+              </a:cxn>
+              <a:cxn ang="0">
+                <a:pos x="T102" y="T103"/>
+              </a:cxn>
+              <a:cxn ang="0">
+                <a:pos x="T104" y="T105"/>
+              </a:cxn>
+              <a:cxn ang="0">
+                <a:pos x="T106" y="T107"/>
+              </a:cxn>
+              <a:cxn ang="0">
+                <a:pos x="T108" y="T109"/>
+              </a:cxn>
+              <a:cxn ang="0">
+                <a:pos x="T110" y="T111"/>
+              </a:cxn>
+              <a:cxn ang="0">
+                <a:pos x="T112" y="T113"/>
+              </a:cxn>
+              <a:cxn ang="0">
+                <a:pos x="T114" y="T115"/>
+              </a:cxn>
+              <a:cxn ang="0">
+                <a:pos x="T116" y="T117"/>
+              </a:cxn>
+              <a:cxn ang="0">
+                <a:pos x="T118" y="T119"/>
+              </a:cxn>
+              <a:cxn ang="0">
+                <a:pos x="T120" y="T121"/>
+              </a:cxn>
+              <a:cxn ang="0">
+                <a:pos x="T122" y="T123"/>
+              </a:cxn>
+            </a:cxnLst>
+            <a:rect l="0" t="0" r="r" b="b"/>
+            <a:pathLst>
+              <a:path w="661" h="506">
+                <a:moveTo>
+                  <a:pt x="179" y="397"/>
+                </a:moveTo>
+                <a:lnTo>
+                  <a:pt x="144" y="397"/>
+                </a:lnTo>
+                <a:lnTo>
+                  <a:pt x="144" y="433"/>
+                </a:lnTo>
+                <a:lnTo>
+                  <a:pt x="179" y="433"/>
+                </a:lnTo>
+                <a:lnTo>
+                  <a:pt x="179" y="397"/>
+                </a:lnTo>
+                <a:close/>
+                <a:moveTo>
+                  <a:pt x="108" y="324"/>
+                </a:moveTo>
+                <a:lnTo>
+                  <a:pt x="70" y="324"/>
+                </a:lnTo>
+                <a:lnTo>
+                  <a:pt x="70" y="362"/>
+                </a:lnTo>
+                <a:lnTo>
+                  <a:pt x="108" y="362"/>
+                </a:lnTo>
+                <a:lnTo>
+                  <a:pt x="108" y="324"/>
+                </a:lnTo>
+                <a:close/>
+                <a:moveTo>
+                  <a:pt x="108" y="397"/>
+                </a:moveTo>
+                <a:lnTo>
+                  <a:pt x="70" y="397"/>
+                </a:lnTo>
+                <a:lnTo>
+                  <a:pt x="70" y="433"/>
+                </a:lnTo>
+                <a:lnTo>
+                  <a:pt x="108" y="433"/>
+                </a:lnTo>
+                <a:lnTo>
+                  <a:pt x="108" y="397"/>
+                </a:lnTo>
+                <a:close/>
+                <a:moveTo>
+                  <a:pt x="250" y="397"/>
+                </a:moveTo>
+                <a:lnTo>
+                  <a:pt x="215" y="397"/>
+                </a:lnTo>
+                <a:lnTo>
+                  <a:pt x="215" y="433"/>
+                </a:lnTo>
+                <a:lnTo>
+                  <a:pt x="250" y="433"/>
+                </a:lnTo>
+                <a:lnTo>
+                  <a:pt x="250" y="397"/>
+                </a:lnTo>
+                <a:close/>
+                <a:moveTo>
+                  <a:pt x="179" y="324"/>
+                </a:moveTo>
+                <a:lnTo>
+                  <a:pt x="144" y="324"/>
+                </a:lnTo>
+                <a:lnTo>
+                  <a:pt x="144" y="362"/>
+                </a:lnTo>
+                <a:lnTo>
+                  <a:pt x="179" y="362"/>
+                </a:lnTo>
+                <a:lnTo>
+                  <a:pt x="179" y="324"/>
+                </a:lnTo>
+                <a:close/>
+                <a:moveTo>
+                  <a:pt x="576" y="352"/>
+                </a:moveTo>
+                <a:lnTo>
+                  <a:pt x="432" y="352"/>
+                </a:lnTo>
+                <a:lnTo>
+                  <a:pt x="432" y="407"/>
+                </a:lnTo>
+                <a:lnTo>
+                  <a:pt x="576" y="407"/>
+                </a:lnTo>
+                <a:lnTo>
+                  <a:pt x="576" y="352"/>
+                </a:lnTo>
+                <a:close/>
+                <a:moveTo>
+                  <a:pt x="661" y="253"/>
+                </a:moveTo>
+                <a:lnTo>
+                  <a:pt x="661" y="253"/>
+                </a:lnTo>
+                <a:lnTo>
+                  <a:pt x="543" y="0"/>
+                </a:lnTo>
+                <a:lnTo>
+                  <a:pt x="115" y="0"/>
+                </a:lnTo>
+                <a:lnTo>
+                  <a:pt x="0" y="253"/>
+                </a:lnTo>
+                <a:lnTo>
+                  <a:pt x="0" y="253"/>
+                </a:lnTo>
+                <a:lnTo>
+                  <a:pt x="0" y="506"/>
+                </a:lnTo>
+                <a:lnTo>
+                  <a:pt x="661" y="506"/>
+                </a:lnTo>
+                <a:lnTo>
+                  <a:pt x="661" y="506"/>
+                </a:lnTo>
+                <a:lnTo>
+                  <a:pt x="661" y="506"/>
+                </a:lnTo>
+                <a:lnTo>
+                  <a:pt x="661" y="253"/>
+                </a:lnTo>
+                <a:lnTo>
+                  <a:pt x="661" y="253"/>
+                </a:lnTo>
+                <a:close/>
+                <a:moveTo>
+                  <a:pt x="626" y="468"/>
+                </a:moveTo>
+                <a:lnTo>
+                  <a:pt x="35" y="468"/>
+                </a:lnTo>
+                <a:lnTo>
+                  <a:pt x="35" y="288"/>
+                </a:lnTo>
+                <a:lnTo>
+                  <a:pt x="626" y="288"/>
+                </a:lnTo>
+                <a:lnTo>
+                  <a:pt x="626" y="468"/>
+                </a:lnTo>
+                <a:close/>
+                <a:moveTo>
+                  <a:pt x="323" y="324"/>
+                </a:moveTo>
+                <a:lnTo>
+                  <a:pt x="288" y="324"/>
+                </a:lnTo>
+                <a:lnTo>
+                  <a:pt x="288" y="362"/>
+                </a:lnTo>
+                <a:lnTo>
+                  <a:pt x="323" y="362"/>
+                </a:lnTo>
+                <a:lnTo>
+                  <a:pt x="323" y="324"/>
+                </a:lnTo>
+                <a:close/>
+                <a:moveTo>
+                  <a:pt x="323" y="397"/>
+                </a:moveTo>
+                <a:lnTo>
+                  <a:pt x="288" y="397"/>
+                </a:lnTo>
+                <a:lnTo>
+                  <a:pt x="288" y="433"/>
+                </a:lnTo>
+                <a:lnTo>
+                  <a:pt x="323" y="433"/>
+                </a:lnTo>
+                <a:lnTo>
+                  <a:pt x="323" y="397"/>
+                </a:lnTo>
+                <a:close/>
+                <a:moveTo>
+                  <a:pt x="250" y="324"/>
+                </a:moveTo>
+                <a:lnTo>
+                  <a:pt x="215" y="324"/>
+                </a:lnTo>
+                <a:lnTo>
+                  <a:pt x="215" y="362"/>
+                </a:lnTo>
+                <a:lnTo>
+                  <a:pt x="250" y="362"/>
+                </a:lnTo>
+                <a:lnTo>
+                  <a:pt x="250" y="324"/>
+                </a:lnTo>
+                <a:close/>
+              </a:path>
+            </a:pathLst>
+          </a:custGeom>
+          <a:solidFill>
+            <a:srgbClr val="3D6BB6"/>
+          </a:solidFill>
+          <a:ln>
+            <a:noFill/>
+          </a:ln>
+          <a:extLst/>
+        </p:spPr>
+        <p:txBody>
+          <a:bodyPr vert="horz" wrap="square" lIns="91440" tIns="45720" rIns="91440" bIns="45720" numCol="1" anchor="t" anchorCtr="0" compatLnSpc="1">
+            <a:prstTxWarp prst="textNoShape">
+              <a:avLst/>
+            </a:prstTxWarp>
+          </a:bodyPr>
+          <a:lstStyle/>
+          <a:p>
+            <a:pPr algn="ctr">
+              <a:defRPr/>
+            </a:pPr>
+            <a:endParaRPr lang="zh-CN" altLang="en-US" sz="1000" b="1" kern="0">
+              <a:solidFill>
+                <a:srgbClr val="000000"/>
+              </a:solidFill>
+              <a:ea typeface="等线" panose="02010600030101010101" pitchFamily="2" charset="-122"/>
+              <a:cs typeface="Arial" panose="020B0604020202020204" pitchFamily="34" charset="0"/>
+            </a:endParaRPr>
+          </a:p>
+        </p:txBody>
+      </p:sp>
+      <p:pic>
+        <p:nvPicPr>
+          <p:cNvPr id="7" name="图片 6">
+            <a:extLst>
+              <a:ext uri="{FF2B5EF4-FFF2-40B4-BE49-F238E27FC236}">
+                <a16:creationId xmlns:a16="http://schemas.microsoft.com/office/drawing/2014/main" id="{C7F20C3A-4B75-433D-9D75-E5A8DE11D751}"/>
+              </a:ext>
+            </a:extLst>
+          </p:cNvPr>
+          <p:cNvPicPr>
+            <a:picLocks noChangeAspect="1"/>
+          </p:cNvPicPr>
+          <p:nvPr/>
+        </p:nvPicPr>
+        <p:blipFill>
+          <a:blip r:embed="rId2">
+            <a:duotone>
+              <a:schemeClr val="accent2">
+                <a:shade val="45000"/>
+                <a:satMod val="135000"/>
+              </a:schemeClr>
+              <a:prstClr val="white"/>
+            </a:duotone>
+          </a:blip>
+          <a:stretch>
+            <a:fillRect/>
+          </a:stretch>
+        </p:blipFill>
+        <p:spPr>
+          <a:xfrm>
+            <a:off x="2730587" y="1488295"/>
+            <a:ext cx="756745" cy="756745"/>
+          </a:xfrm>
+          <a:prstGeom prst="rect">
+            <a:avLst/>
+          </a:prstGeom>
+          <a:ln>
+            <a:solidFill>
+              <a:srgbClr val="086FF9"/>
+            </a:solidFill>
+          </a:ln>
+        </p:spPr>
+      </p:pic>
+      <p:pic>
+        <p:nvPicPr>
+          <p:cNvPr id="8" name="图片 7">
+            <a:extLst>
+              <a:ext uri="{FF2B5EF4-FFF2-40B4-BE49-F238E27FC236}">
+                <a16:creationId xmlns:a16="http://schemas.microsoft.com/office/drawing/2014/main" id="{1F314DDE-F14A-4907-B23F-159A42944F00}"/>
+              </a:ext>
+            </a:extLst>
+          </p:cNvPr>
+          <p:cNvPicPr>
+            <a:picLocks noChangeAspect="1"/>
+          </p:cNvPicPr>
+          <p:nvPr/>
+        </p:nvPicPr>
+        <p:blipFill>
+          <a:blip r:embed="rId2">
+            <a:duotone>
+              <a:schemeClr val="accent2">
+                <a:shade val="45000"/>
+                <a:satMod val="135000"/>
+              </a:schemeClr>
+              <a:prstClr val="white"/>
+            </a:duotone>
+          </a:blip>
+          <a:stretch>
+            <a:fillRect/>
+          </a:stretch>
+        </p:blipFill>
+        <p:spPr>
+          <a:xfrm>
+            <a:off x="2730587" y="2580816"/>
+            <a:ext cx="756745" cy="756745"/>
+          </a:xfrm>
+          <a:prstGeom prst="rect">
+            <a:avLst/>
+          </a:prstGeom>
+          <a:ln>
+            <a:solidFill>
+              <a:srgbClr val="086FF9"/>
+            </a:solidFill>
+          </a:ln>
+        </p:spPr>
+      </p:pic>
+      <p:pic>
+        <p:nvPicPr>
+          <p:cNvPr id="9" name="图片 8">
+            <a:extLst>
+              <a:ext uri="{FF2B5EF4-FFF2-40B4-BE49-F238E27FC236}">
+                <a16:creationId xmlns:a16="http://schemas.microsoft.com/office/drawing/2014/main" id="{73CF3597-1FF6-4141-9FBA-1D8D65960B3E}"/>
+              </a:ext>
+            </a:extLst>
+          </p:cNvPr>
+          <p:cNvPicPr>
+            <a:picLocks noChangeAspect="1"/>
+          </p:cNvPicPr>
+          <p:nvPr/>
+        </p:nvPicPr>
+        <p:blipFill>
+          <a:blip r:embed="rId2">
+            <a:duotone>
+              <a:schemeClr val="accent2">
+                <a:shade val="45000"/>
+                <a:satMod val="135000"/>
+              </a:schemeClr>
+              <a:prstClr val="white"/>
+            </a:duotone>
+          </a:blip>
+          <a:stretch>
+            <a:fillRect/>
+          </a:stretch>
+        </p:blipFill>
+        <p:spPr>
+          <a:xfrm>
+            <a:off x="2730587" y="3673337"/>
+            <a:ext cx="756745" cy="756745"/>
+          </a:xfrm>
+          <a:prstGeom prst="rect">
+            <a:avLst/>
+          </a:prstGeom>
+          <a:ln>
+            <a:solidFill>
+              <a:srgbClr val="086FF9"/>
+            </a:solidFill>
+          </a:ln>
+        </p:spPr>
+      </p:pic>
+      <p:pic>
+        <p:nvPicPr>
+          <p:cNvPr id="11" name="图片 10">
+            <a:extLst>
+              <a:ext uri="{FF2B5EF4-FFF2-40B4-BE49-F238E27FC236}">
+                <a16:creationId xmlns:a16="http://schemas.microsoft.com/office/drawing/2014/main" id="{BE9F5F56-3659-4C0C-B927-E7A4DE6A095A}"/>
+              </a:ext>
+            </a:extLst>
+          </p:cNvPr>
+          <p:cNvPicPr>
+            <a:picLocks noChangeAspect="1"/>
+          </p:cNvPicPr>
+          <p:nvPr/>
+        </p:nvPicPr>
+        <p:blipFill>
+          <a:blip r:embed="rId3">
+            <a:duotone>
+              <a:schemeClr val="accent2">
+                <a:shade val="45000"/>
+                <a:satMod val="135000"/>
+              </a:schemeClr>
+              <a:prstClr val="white"/>
+            </a:duotone>
+          </a:blip>
+          <a:stretch>
+            <a:fillRect/>
+          </a:stretch>
+        </p:blipFill>
+        <p:spPr>
+          <a:xfrm>
+            <a:off x="5519426" y="4521522"/>
+            <a:ext cx="988555" cy="988555"/>
+          </a:xfrm>
+          <a:prstGeom prst="rect">
+            <a:avLst/>
+          </a:prstGeom>
+        </p:spPr>
+      </p:pic>
+      <p:grpSp>
+        <p:nvGrpSpPr>
+          <p:cNvPr id="12" name="组 176">
+            <a:extLst>
+              <a:ext uri="{FF2B5EF4-FFF2-40B4-BE49-F238E27FC236}">
+                <a16:creationId xmlns:a16="http://schemas.microsoft.com/office/drawing/2014/main" id="{BEC174A6-AFBA-44D0-82C7-F4AF012D3467}"/>
+              </a:ext>
+            </a:extLst>
+          </p:cNvPr>
+          <p:cNvGrpSpPr/>
+          <p:nvPr/>
+        </p:nvGrpSpPr>
+        <p:grpSpPr>
+          <a:xfrm>
+            <a:off x="8206818" y="2657960"/>
+            <a:ext cx="1034831" cy="909988"/>
+            <a:chOff x="5416563" y="3362707"/>
+            <a:chExt cx="459880" cy="404400"/>
+          </a:xfrm>
+        </p:grpSpPr>
+        <p:sp>
+          <p:nvSpPr>
+            <p:cNvPr id="13" name="Rectangle 27">
+              <a:extLst>
+                <a:ext uri="{FF2B5EF4-FFF2-40B4-BE49-F238E27FC236}">
+                  <a16:creationId xmlns:a16="http://schemas.microsoft.com/office/drawing/2014/main" id="{29ECFF4F-0840-4CD5-AAAC-3E909D7231B8}"/>
+                </a:ext>
+              </a:extLst>
+            </p:cNvPr>
+            <p:cNvSpPr>
+              <a:spLocks noChangeArrowheads="1"/>
+            </p:cNvSpPr>
+            <p:nvPr/>
+          </p:nvSpPr>
+          <p:spPr bwMode="auto">
+            <a:xfrm>
+              <a:off x="5518689" y="3685041"/>
+              <a:ext cx="186643" cy="82066"/>
+            </a:xfrm>
+            <a:prstGeom prst="rect">
+              <a:avLst/>
+            </a:prstGeom>
+            <a:noFill/>
+            <a:ln>
+              <a:noFill/>
+            </a:ln>
+            <a:extLst>
+              <a:ext uri="{909E8E84-426E-40DD-AFC4-6F175D3DCCD1}">
+                <a14:hiddenFill xmlns:a14="http://schemas.microsoft.com/office/drawing/2010/main">
+                  <a:solidFill>
+                    <a:srgbClr val="FFFFFF"/>
+                  </a:solidFill>
+                </a14:hiddenFill>
+              </a:ext>
+              <a:ext uri="{91240B29-F687-4F45-9708-019B960494DF}">
+                <a14:hiddenLine xmlns:a14="http://schemas.microsoft.com/office/drawing/2010/main" w="9525">
+                  <a:solidFill>
+                    <a:srgbClr val="000000"/>
+                  </a:solidFill>
+                  <a:miter lim="800000"/>
+                  <a:headEnd/>
+                  <a:tailEnd/>
+                </a14:hiddenLine>
+              </a:ext>
+            </a:extLst>
+          </p:spPr>
+          <p:txBody>
+            <a:bodyPr vert="horz" wrap="none" lIns="0" tIns="0" rIns="0" bIns="0" numCol="1" anchor="t" anchorCtr="0" compatLnSpc="1">
+              <a:prstTxWarp prst="textNoShape">
+                <a:avLst/>
+              </a:prstTxWarp>
+              <a:spAutoFit/>
+            </a:bodyPr>
+            <a:lstStyle>
+              <a:lvl1pPr eaLnBrk="0" fontAlgn="base" hangingPunct="0">
+                <a:spcBef>
+                  <a:spcPct val="0"/>
+                </a:spcBef>
+                <a:spcAft>
+                  <a:spcPct val="0"/>
+                </a:spcAft>
+                <a:defRPr>
+                  <a:solidFill>
+                    <a:schemeClr val="tx1"/>
+                  </a:solidFill>
+                  <a:latin typeface="Arial" panose="020B0604020202020204" pitchFamily="34" charset="0"/>
+                </a:defRPr>
+              </a:lvl1pPr>
+              <a:lvl2pPr eaLnBrk="0" fontAlgn="base" hangingPunct="0">
+                <a:spcBef>
+                  <a:spcPct val="0"/>
+                </a:spcBef>
+                <a:spcAft>
+                  <a:spcPct val="0"/>
+                </a:spcAft>
+                <a:defRPr>
+                  <a:solidFill>
+                    <a:schemeClr val="tx1"/>
+                  </a:solidFill>
+                  <a:latin typeface="Arial" panose="020B0604020202020204" pitchFamily="34" charset="0"/>
+                </a:defRPr>
+              </a:lvl2pPr>
+              <a:lvl3pPr eaLnBrk="0" fontAlgn="base" hangingPunct="0">
+                <a:spcBef>
+                  <a:spcPct val="0"/>
+                </a:spcBef>
+                <a:spcAft>
+                  <a:spcPct val="0"/>
+                </a:spcAft>
+                <a:defRPr>
+                  <a:solidFill>
+                    <a:schemeClr val="tx1"/>
+                  </a:solidFill>
+                  <a:latin typeface="Arial" panose="020B0604020202020204" pitchFamily="34" charset="0"/>
+                </a:defRPr>
+              </a:lvl3pPr>
+              <a:lvl4pPr eaLnBrk="0" fontAlgn="base" hangingPunct="0">
+                <a:spcBef>
+                  <a:spcPct val="0"/>
+                </a:spcBef>
+                <a:spcAft>
+                  <a:spcPct val="0"/>
+                </a:spcAft>
+                <a:defRPr>
+                  <a:solidFill>
+                    <a:schemeClr val="tx1"/>
+                  </a:solidFill>
+                  <a:latin typeface="Arial" panose="020B0604020202020204" pitchFamily="34" charset="0"/>
+                </a:defRPr>
+              </a:lvl4pPr>
+              <a:lvl5pPr eaLnBrk="0" fontAlgn="base" hangingPunct="0">
+                <a:spcBef>
+                  <a:spcPct val="0"/>
+                </a:spcBef>
+                <a:spcAft>
+                  <a:spcPct val="0"/>
+                </a:spcAft>
+                <a:defRPr>
+                  <a:solidFill>
+                    <a:schemeClr val="tx1"/>
+                  </a:solidFill>
+                  <a:latin typeface="Arial" panose="020B0604020202020204" pitchFamily="34" charset="0"/>
+                </a:defRPr>
+              </a:lvl5pPr>
+              <a:lvl6pPr eaLnBrk="0" fontAlgn="base" hangingPunct="0">
+                <a:spcBef>
+                  <a:spcPct val="0"/>
+                </a:spcBef>
+                <a:spcAft>
+                  <a:spcPct val="0"/>
+                </a:spcAft>
+                <a:defRPr>
+                  <a:solidFill>
+                    <a:schemeClr val="tx1"/>
+                  </a:solidFill>
+                  <a:latin typeface="Arial" panose="020B0604020202020204" pitchFamily="34" charset="0"/>
+                </a:defRPr>
+              </a:lvl6pPr>
+              <a:lvl7pPr eaLnBrk="0" fontAlgn="base" hangingPunct="0">
+                <a:spcBef>
+                  <a:spcPct val="0"/>
+                </a:spcBef>
+                <a:spcAft>
+                  <a:spcPct val="0"/>
+                </a:spcAft>
+                <a:defRPr>
+                  <a:solidFill>
+                    <a:schemeClr val="tx1"/>
+                  </a:solidFill>
+                  <a:latin typeface="Arial" panose="020B0604020202020204" pitchFamily="34" charset="0"/>
+                </a:defRPr>
+              </a:lvl7pPr>
+              <a:lvl8pPr eaLnBrk="0" fontAlgn="base" hangingPunct="0">
+                <a:spcBef>
+                  <a:spcPct val="0"/>
+                </a:spcBef>
+                <a:spcAft>
+                  <a:spcPct val="0"/>
+                </a:spcAft>
+                <a:defRPr>
+                  <a:solidFill>
+                    <a:schemeClr val="tx1"/>
+                  </a:solidFill>
+                  <a:latin typeface="Arial" panose="020B0604020202020204" pitchFamily="34" charset="0"/>
+                </a:defRPr>
+              </a:lvl8pPr>
+              <a:lvl9pPr eaLnBrk="0" fontAlgn="base" hangingPunct="0">
+                <a:spcBef>
+                  <a:spcPct val="0"/>
+                </a:spcBef>
+                <a:spcAft>
+                  <a:spcPct val="0"/>
+                </a:spcAft>
+                <a:defRPr>
+                  <a:solidFill>
+                    <a:schemeClr val="tx1"/>
+                  </a:solidFill>
+                  <a:latin typeface="Arial" panose="020B0604020202020204" pitchFamily="34" charset="0"/>
+                </a:defRPr>
+              </a:lvl9pPr>
+            </a:lstStyle>
+            <a:p>
+              <a:pPr algn="ctr">
+                <a:defRPr/>
+              </a:pPr>
+              <a:r>
+                <a:rPr lang="en-US" altLang="zh-CN" sz="1200" b="1" kern="0" dirty="0" err="1">
+                  <a:solidFill>
+                    <a:srgbClr val="000000"/>
+                  </a:solidFill>
+                  <a:ea typeface="等线" panose="02010600030101010101" pitchFamily="2" charset="-122"/>
+                  <a:cs typeface="Arial" panose="020B0604020202020204" pitchFamily="34" charset="0"/>
+                </a:rPr>
+                <a:t>EnOS</a:t>
+              </a:r>
+              <a:endParaRPr lang="zh-CN" altLang="en-US" sz="1200" b="1" kern="0" dirty="0">
+                <a:solidFill>
+                  <a:srgbClr val="000000"/>
+                </a:solidFill>
+                <a:ea typeface="等线" panose="02010600030101010101" pitchFamily="2" charset="-122"/>
+                <a:cs typeface="Arial" panose="020B0604020202020204" pitchFamily="34" charset="0"/>
+              </a:endParaRPr>
+            </a:p>
+          </p:txBody>
+        </p:sp>
+        <p:sp>
+          <p:nvSpPr>
+            <p:cNvPr id="14" name="Freeform 64">
+              <a:extLst>
+                <a:ext uri="{FF2B5EF4-FFF2-40B4-BE49-F238E27FC236}">
+                  <a16:creationId xmlns:a16="http://schemas.microsoft.com/office/drawing/2014/main" id="{23AFF034-486B-4E85-97C8-377EF9780D6A}"/>
+                </a:ext>
+              </a:extLst>
+            </p:cNvPr>
+            <p:cNvSpPr>
+              <a:spLocks/>
+            </p:cNvSpPr>
+            <p:nvPr/>
+          </p:nvSpPr>
+          <p:spPr bwMode="auto">
+            <a:xfrm>
+              <a:off x="5416563" y="3362707"/>
+              <a:ext cx="459880" cy="322334"/>
+            </a:xfrm>
+            <a:custGeom>
+              <a:avLst/>
+              <a:gdLst>
+                <a:gd name="T0" fmla="*/ 137 w 280"/>
+                <a:gd name="T1" fmla="*/ 98 h 196"/>
+                <a:gd name="T2" fmla="*/ 65 w 280"/>
+                <a:gd name="T3" fmla="*/ 48 h 196"/>
+                <a:gd name="T4" fmla="*/ 0 w 280"/>
+                <a:gd name="T5" fmla="*/ 122 h 196"/>
+                <a:gd name="T6" fmla="*/ 64 w 280"/>
+                <a:gd name="T7" fmla="*/ 196 h 196"/>
+                <a:gd name="T8" fmla="*/ 64 w 280"/>
+                <a:gd name="T9" fmla="*/ 196 h 196"/>
+                <a:gd name="T10" fmla="*/ 215 w 280"/>
+                <a:gd name="T11" fmla="*/ 196 h 196"/>
+                <a:gd name="T12" fmla="*/ 224 w 280"/>
+                <a:gd name="T13" fmla="*/ 196 h 196"/>
+                <a:gd name="T14" fmla="*/ 280 w 280"/>
+                <a:gd name="T15" fmla="*/ 129 h 196"/>
+                <a:gd name="T16" fmla="*/ 235 w 280"/>
+                <a:gd name="T17" fmla="*/ 65 h 196"/>
+                <a:gd name="T18" fmla="*/ 147 w 280"/>
+                <a:gd name="T19" fmla="*/ 0 h 196"/>
+                <a:gd name="T20" fmla="*/ 73 w 280"/>
+                <a:gd name="T21" fmla="*/ 36 h 196"/>
+                <a:gd name="T22" fmla="*/ 137 w 280"/>
+                <a:gd name="T23" fmla="*/ 98 h 196"/>
+                <a:gd name="T24" fmla="*/ 137 w 280"/>
+                <a:gd name="T25" fmla="*/ 98 h 196"/>
+              </a:gdLst>
+              <a:ahLst/>
+              <a:cxnLst>
+                <a:cxn ang="0">
+                  <a:pos x="T0" y="T1"/>
+                </a:cxn>
+                <a:cxn ang="0">
+                  <a:pos x="T2" y="T3"/>
+                </a:cxn>
+                <a:cxn ang="0">
+                  <a:pos x="T4" y="T5"/>
+                </a:cxn>
+                <a:cxn ang="0">
+                  <a:pos x="T6" y="T7"/>
+                </a:cxn>
+                <a:cxn ang="0">
+                  <a:pos x="T8" y="T9"/>
+                </a:cxn>
+                <a:cxn ang="0">
+                  <a:pos x="T10" y="T11"/>
+                </a:cxn>
+                <a:cxn ang="0">
+                  <a:pos x="T12" y="T13"/>
+                </a:cxn>
+                <a:cxn ang="0">
+                  <a:pos x="T14" y="T15"/>
+                </a:cxn>
+                <a:cxn ang="0">
+                  <a:pos x="T16" y="T17"/>
+                </a:cxn>
+                <a:cxn ang="0">
+                  <a:pos x="T18" y="T19"/>
+                </a:cxn>
+                <a:cxn ang="0">
+                  <a:pos x="T20" y="T21"/>
+                </a:cxn>
+                <a:cxn ang="0">
+                  <a:pos x="T22" y="T23"/>
+                </a:cxn>
+                <a:cxn ang="0">
+                  <a:pos x="T24" y="T25"/>
+                </a:cxn>
+              </a:cxnLst>
+              <a:rect l="0" t="0" r="r" b="b"/>
+              <a:pathLst>
+                <a:path w="280" h="196">
+                  <a:moveTo>
+                    <a:pt x="137" y="98"/>
+                  </a:moveTo>
+                  <a:cubicBezTo>
+                    <a:pt x="137" y="98"/>
+                    <a:pt x="127" y="64"/>
+                    <a:pt x="65" y="48"/>
+                  </a:cubicBezTo>
+                  <a:cubicBezTo>
+                    <a:pt x="28" y="53"/>
+                    <a:pt x="0" y="84"/>
+                    <a:pt x="0" y="122"/>
+                  </a:cubicBezTo>
+                  <a:cubicBezTo>
+                    <a:pt x="0" y="159"/>
+                    <a:pt x="28" y="191"/>
+                    <a:pt x="64" y="196"/>
+                  </a:cubicBezTo>
+                  <a:cubicBezTo>
+                    <a:pt x="64" y="196"/>
+                    <a:pt x="64" y="196"/>
+                    <a:pt x="64" y="196"/>
+                  </a:cubicBezTo>
+                  <a:cubicBezTo>
+                    <a:pt x="215" y="196"/>
+                    <a:pt x="215" y="196"/>
+                    <a:pt x="215" y="196"/>
+                  </a:cubicBezTo>
+                  <a:cubicBezTo>
+                    <a:pt x="224" y="196"/>
+                    <a:pt x="224" y="196"/>
+                    <a:pt x="224" y="196"/>
+                  </a:cubicBezTo>
+                  <a:cubicBezTo>
+                    <a:pt x="256" y="190"/>
+                    <a:pt x="280" y="162"/>
+                    <a:pt x="280" y="129"/>
+                  </a:cubicBezTo>
+                  <a:cubicBezTo>
+                    <a:pt x="280" y="100"/>
+                    <a:pt x="262" y="75"/>
+                    <a:pt x="235" y="65"/>
+                  </a:cubicBezTo>
+                  <a:cubicBezTo>
+                    <a:pt x="223" y="26"/>
+                    <a:pt x="188" y="0"/>
+                    <a:pt x="147" y="0"/>
+                  </a:cubicBezTo>
+                  <a:cubicBezTo>
+                    <a:pt x="118" y="0"/>
+                    <a:pt x="91" y="13"/>
+                    <a:pt x="73" y="36"/>
+                  </a:cubicBezTo>
+                  <a:cubicBezTo>
+                    <a:pt x="104" y="40"/>
+                    <a:pt x="133" y="56"/>
+                    <a:pt x="137" y="98"/>
+                  </a:cubicBezTo>
+                  <a:cubicBezTo>
+                    <a:pt x="137" y="98"/>
+                    <a:pt x="137" y="98"/>
+                    <a:pt x="137" y="98"/>
+                  </a:cubicBezTo>
+                  <a:close/>
+                </a:path>
+              </a:pathLst>
+            </a:custGeom>
+            <a:solidFill>
+              <a:srgbClr val="3D6BB6"/>
+            </a:solidFill>
+            <a:ln>
+              <a:noFill/>
+            </a:ln>
+            <a:extLst/>
+          </p:spPr>
+          <p:txBody>
+            <a:bodyPr vert="horz" wrap="square" lIns="91440" tIns="45720" rIns="91440" bIns="45720" numCol="1" anchor="t" anchorCtr="0" compatLnSpc="1">
+              <a:prstTxWarp prst="textNoShape">
+                <a:avLst/>
+              </a:prstTxWarp>
+            </a:bodyPr>
+            <a:lstStyle/>
+            <a:p>
+              <a:pPr algn="ctr">
+                <a:defRPr/>
+              </a:pPr>
+              <a:endParaRPr lang="zh-CN" altLang="en-US" sz="1000" b="1" kern="0">
+                <a:solidFill>
+                  <a:srgbClr val="000000"/>
+                </a:solidFill>
+                <a:ea typeface="等线" panose="02010600030101010101" pitchFamily="2" charset="-122"/>
+                <a:cs typeface="Arial" panose="020B0604020202020204" pitchFamily="34" charset="0"/>
+              </a:endParaRPr>
+            </a:p>
+          </p:txBody>
+        </p:sp>
+      </p:grpSp>
+      <p:sp>
+        <p:nvSpPr>
+          <p:cNvPr id="15" name="Rectangle 28">
+            <a:extLst>
+              <a:ext uri="{FF2B5EF4-FFF2-40B4-BE49-F238E27FC236}">
+                <a16:creationId xmlns:a16="http://schemas.microsoft.com/office/drawing/2014/main" id="{DBE50084-3348-4F2D-8DA1-0EBDC0F58020}"/>
+              </a:ext>
+            </a:extLst>
+          </p:cNvPr>
+          <p:cNvSpPr>
+            <a:spLocks noChangeArrowheads="1"/>
+          </p:cNvSpPr>
+          <p:nvPr/>
+        </p:nvSpPr>
+        <p:spPr bwMode="auto">
+          <a:xfrm>
+            <a:off x="5811470" y="3429001"/>
+            <a:ext cx="376706" cy="184666"/>
+          </a:xfrm>
+          <a:prstGeom prst="rect">
+            <a:avLst/>
+          </a:prstGeom>
+          <a:noFill/>
+          <a:ln>
+            <a:noFill/>
+          </a:ln>
+          <a:extLst>
+            <a:ext uri="{909E8E84-426E-40DD-AFC4-6F175D3DCCD1}">
+              <a14:hiddenFill xmlns:a14="http://schemas.microsoft.com/office/drawing/2010/main">
+                <a:solidFill>
+                  <a:srgbClr val="FFFFFF"/>
+                </a:solidFill>
+              </a14:hiddenFill>
+            </a:ext>
+            <a:ext uri="{91240B29-F687-4F45-9708-019B960494DF}">
+              <a14:hiddenLine xmlns:a14="http://schemas.microsoft.com/office/drawing/2010/main" w="9525">
+                <a:solidFill>
+                  <a:srgbClr val="000000"/>
+                </a:solidFill>
+                <a:miter lim="800000"/>
+                <a:headEnd/>
+                <a:tailEnd/>
+              </a14:hiddenLine>
+            </a:ext>
+          </a:extLst>
+        </p:spPr>
+        <p:txBody>
+          <a:bodyPr vert="horz" wrap="none" lIns="0" tIns="0" rIns="0" bIns="0" numCol="1" anchor="t" anchorCtr="0" compatLnSpc="1">
+            <a:prstTxWarp prst="textNoShape">
+              <a:avLst/>
+            </a:prstTxWarp>
+            <a:spAutoFit/>
+          </a:bodyPr>
+          <a:lstStyle>
+            <a:lvl1pPr eaLnBrk="0" fontAlgn="base" hangingPunct="0">
+              <a:spcBef>
+                <a:spcPct val="0"/>
+              </a:spcBef>
+              <a:spcAft>
+                <a:spcPct val="0"/>
+              </a:spcAft>
+              <a:defRPr>
+                <a:solidFill>
+                  <a:schemeClr val="tx1"/>
+                </a:solidFill>
+                <a:latin typeface="Arial" panose="020B0604020202020204" pitchFamily="34" charset="0"/>
+              </a:defRPr>
+            </a:lvl1pPr>
+            <a:lvl2pPr eaLnBrk="0" fontAlgn="base" hangingPunct="0">
+              <a:spcBef>
+                <a:spcPct val="0"/>
+              </a:spcBef>
+              <a:spcAft>
+                <a:spcPct val="0"/>
+              </a:spcAft>
+              <a:defRPr>
+                <a:solidFill>
+                  <a:schemeClr val="tx1"/>
+                </a:solidFill>
+                <a:latin typeface="Arial" panose="020B0604020202020204" pitchFamily="34" charset="0"/>
+              </a:defRPr>
+            </a:lvl2pPr>
+            <a:lvl3pPr eaLnBrk="0" fontAlgn="base" hangingPunct="0">
+              <a:spcBef>
+                <a:spcPct val="0"/>
+              </a:spcBef>
+              <a:spcAft>
+                <a:spcPct val="0"/>
+              </a:spcAft>
+              <a:defRPr>
+                <a:solidFill>
+                  <a:schemeClr val="tx1"/>
+                </a:solidFill>
+                <a:latin typeface="Arial" panose="020B0604020202020204" pitchFamily="34" charset="0"/>
+              </a:defRPr>
+            </a:lvl3pPr>
+            <a:lvl4pPr eaLnBrk="0" fontAlgn="base" hangingPunct="0">
+              <a:spcBef>
+                <a:spcPct val="0"/>
+              </a:spcBef>
+              <a:spcAft>
+                <a:spcPct val="0"/>
+              </a:spcAft>
+              <a:defRPr>
+                <a:solidFill>
+                  <a:schemeClr val="tx1"/>
+                </a:solidFill>
+                <a:latin typeface="Arial" panose="020B0604020202020204" pitchFamily="34" charset="0"/>
+              </a:defRPr>
+            </a:lvl4pPr>
+            <a:lvl5pPr eaLnBrk="0" fontAlgn="base" hangingPunct="0">
+              <a:spcBef>
+                <a:spcPct val="0"/>
+              </a:spcBef>
+              <a:spcAft>
+                <a:spcPct val="0"/>
+              </a:spcAft>
+              <a:defRPr>
+                <a:solidFill>
+                  <a:schemeClr val="tx1"/>
+                </a:solidFill>
+                <a:latin typeface="Arial" panose="020B0604020202020204" pitchFamily="34" charset="0"/>
+              </a:defRPr>
+            </a:lvl5pPr>
+            <a:lvl6pPr eaLnBrk="0" fontAlgn="base" hangingPunct="0">
+              <a:spcBef>
+                <a:spcPct val="0"/>
+              </a:spcBef>
+              <a:spcAft>
+                <a:spcPct val="0"/>
+              </a:spcAft>
+              <a:defRPr>
+                <a:solidFill>
+                  <a:schemeClr val="tx1"/>
+                </a:solidFill>
+                <a:latin typeface="Arial" panose="020B0604020202020204" pitchFamily="34" charset="0"/>
+              </a:defRPr>
+            </a:lvl6pPr>
+            <a:lvl7pPr eaLnBrk="0" fontAlgn="base" hangingPunct="0">
+              <a:spcBef>
+                <a:spcPct val="0"/>
+              </a:spcBef>
+              <a:spcAft>
+                <a:spcPct val="0"/>
+              </a:spcAft>
+              <a:defRPr>
+                <a:solidFill>
+                  <a:schemeClr val="tx1"/>
+                </a:solidFill>
+                <a:latin typeface="Arial" panose="020B0604020202020204" pitchFamily="34" charset="0"/>
+              </a:defRPr>
+            </a:lvl7pPr>
+            <a:lvl8pPr eaLnBrk="0" fontAlgn="base" hangingPunct="0">
+              <a:spcBef>
+                <a:spcPct val="0"/>
+              </a:spcBef>
+              <a:spcAft>
+                <a:spcPct val="0"/>
+              </a:spcAft>
+              <a:defRPr>
+                <a:solidFill>
+                  <a:schemeClr val="tx1"/>
+                </a:solidFill>
+                <a:latin typeface="Arial" panose="020B0604020202020204" pitchFamily="34" charset="0"/>
+              </a:defRPr>
+            </a:lvl8pPr>
+            <a:lvl9pPr eaLnBrk="0" fontAlgn="base" hangingPunct="0">
+              <a:spcBef>
+                <a:spcPct val="0"/>
+              </a:spcBef>
+              <a:spcAft>
+                <a:spcPct val="0"/>
+              </a:spcAft>
+              <a:defRPr>
+                <a:solidFill>
+                  <a:schemeClr val="tx1"/>
+                </a:solidFill>
+                <a:latin typeface="Arial" panose="020B0604020202020204" pitchFamily="34" charset="0"/>
+              </a:defRPr>
+            </a:lvl9pPr>
+          </a:lstStyle>
+          <a:p>
+            <a:pPr algn="ctr">
+              <a:defRPr/>
+            </a:pPr>
+            <a:r>
+              <a:rPr lang="zh-CN" altLang="zh-CN" sz="1200" b="1" kern="0" dirty="0">
+                <a:solidFill>
+                  <a:srgbClr val="000000"/>
+                </a:solidFill>
+                <a:ea typeface="等线" panose="02010600030101010101" pitchFamily="2" charset="-122"/>
+                <a:cs typeface="Arial" panose="020B0604020202020204" pitchFamily="34" charset="0"/>
+              </a:rPr>
+              <a:t>Edge</a:t>
+            </a:r>
+          </a:p>
+        </p:txBody>
+      </p:sp>
+      <p:sp>
+        <p:nvSpPr>
+          <p:cNvPr id="16" name="矩形 15">
+            <a:extLst>
+              <a:ext uri="{FF2B5EF4-FFF2-40B4-BE49-F238E27FC236}">
+                <a16:creationId xmlns:a16="http://schemas.microsoft.com/office/drawing/2014/main" id="{FC38C850-7FEB-4973-9FE6-1C640FF22BD6}"/>
+              </a:ext>
+            </a:extLst>
+          </p:cNvPr>
+          <p:cNvSpPr/>
+          <p:nvPr/>
+        </p:nvSpPr>
+        <p:spPr>
+          <a:xfrm>
+            <a:off x="2130552" y="1261872"/>
+            <a:ext cx="1984248" cy="3493008"/>
+          </a:xfrm>
+          <a:prstGeom prst="rect">
+            <a:avLst/>
+          </a:prstGeom>
+          <a:noFill/>
+          <a:ln w="25400">
+            <a:prstDash val="sysDash"/>
+          </a:ln>
+        </p:spPr>
+        <p:style>
+          <a:lnRef idx="2">
+            <a:schemeClr val="accent1">
+              <a:shade val="50000"/>
+            </a:schemeClr>
+          </a:lnRef>
+          <a:fillRef idx="1">
+            <a:schemeClr val="accent1"/>
+          </a:fillRef>
+          <a:effectRef idx="0">
+            <a:schemeClr val="accent1"/>
+          </a:effectRef>
+          <a:fontRef idx="minor">
+            <a:schemeClr val="lt1"/>
+          </a:fontRef>
+        </p:style>
+        <p:txBody>
+          <a:bodyPr rtlCol="0" anchor="ctr"/>
+          <a:lstStyle/>
+          <a:p>
+            <a:pPr algn="ctr"/>
+            <a:endParaRPr lang="zh-CN" altLang="en-US" dirty="0"/>
+          </a:p>
+        </p:txBody>
+      </p:sp>
+      <p:sp>
+        <p:nvSpPr>
+          <p:cNvPr id="17" name="文本框 16">
+            <a:extLst>
+              <a:ext uri="{FF2B5EF4-FFF2-40B4-BE49-F238E27FC236}">
+                <a16:creationId xmlns:a16="http://schemas.microsoft.com/office/drawing/2014/main" id="{F8F30A28-94ED-4CF3-BFF5-3253A1C5C789}"/>
+              </a:ext>
+            </a:extLst>
+          </p:cNvPr>
+          <p:cNvSpPr txBox="1"/>
+          <p:nvPr/>
+        </p:nvSpPr>
+        <p:spPr>
+          <a:xfrm>
+            <a:off x="2847093" y="4416077"/>
+            <a:ext cx="1490472" cy="276999"/>
+          </a:xfrm>
+          <a:prstGeom prst="rect">
+            <a:avLst/>
+          </a:prstGeom>
+          <a:noFill/>
+        </p:spPr>
+        <p:txBody>
+          <a:bodyPr wrap="square" rtlCol="0">
+            <a:spAutoFit/>
+          </a:bodyPr>
+          <a:lstStyle/>
+          <a:p>
+            <a:r>
+              <a:rPr lang="zh-CN" altLang="en-US" sz="1200" b="1" dirty="0">
+                <a:latin typeface="Arial" panose="020B0604020202020204" pitchFamily="34" charset="0"/>
+                <a:cs typeface="Arial" panose="020B0604020202020204" pitchFamily="34" charset="0"/>
+              </a:rPr>
+              <a:t>电表</a:t>
+            </a:r>
+          </a:p>
+        </p:txBody>
+      </p:sp>
+      <p:sp>
+        <p:nvSpPr>
+          <p:cNvPr id="18" name="Rectangle 28">
+            <a:extLst>
+              <a:ext uri="{FF2B5EF4-FFF2-40B4-BE49-F238E27FC236}">
+                <a16:creationId xmlns:a16="http://schemas.microsoft.com/office/drawing/2014/main" id="{CDEA3867-4D4F-4599-A2A0-E377BB852CCB}"/>
+              </a:ext>
+            </a:extLst>
+          </p:cNvPr>
+          <p:cNvSpPr>
+            <a:spLocks noChangeArrowheads="1"/>
+          </p:cNvSpPr>
+          <p:nvPr/>
+        </p:nvSpPr>
+        <p:spPr bwMode="auto">
+          <a:xfrm>
+            <a:off x="5615102" y="5417744"/>
+            <a:ext cx="769442" cy="184666"/>
+          </a:xfrm>
+          <a:prstGeom prst="rect">
+            <a:avLst/>
+          </a:prstGeom>
+          <a:noFill/>
+          <a:ln>
+            <a:noFill/>
+          </a:ln>
+          <a:extLst>
+            <a:ext uri="{909E8E84-426E-40DD-AFC4-6F175D3DCCD1}">
+              <a14:hiddenFill xmlns:a14="http://schemas.microsoft.com/office/drawing/2010/main">
+                <a:solidFill>
+                  <a:srgbClr val="FFFFFF"/>
+                </a:solidFill>
+              </a14:hiddenFill>
+            </a:ext>
+            <a:ext uri="{91240B29-F687-4F45-9708-019B960494DF}">
+              <a14:hiddenLine xmlns:a14="http://schemas.microsoft.com/office/drawing/2010/main" w="9525">
+                <a:solidFill>
+                  <a:srgbClr val="000000"/>
+                </a:solidFill>
+                <a:miter lim="800000"/>
+                <a:headEnd/>
+                <a:tailEnd/>
+              </a14:hiddenLine>
+            </a:ext>
+          </a:extLst>
+        </p:spPr>
+        <p:txBody>
+          <a:bodyPr vert="horz" wrap="none" lIns="0" tIns="0" rIns="0" bIns="0" numCol="1" anchor="t" anchorCtr="0" compatLnSpc="1">
+            <a:prstTxWarp prst="textNoShape">
+              <a:avLst/>
+            </a:prstTxWarp>
+            <a:spAutoFit/>
+          </a:bodyPr>
+          <a:lstStyle>
+            <a:lvl1pPr eaLnBrk="0" fontAlgn="base" hangingPunct="0">
+              <a:spcBef>
+                <a:spcPct val="0"/>
+              </a:spcBef>
+              <a:spcAft>
+                <a:spcPct val="0"/>
+              </a:spcAft>
+              <a:defRPr>
+                <a:solidFill>
+                  <a:schemeClr val="tx1"/>
+                </a:solidFill>
+                <a:latin typeface="Arial" panose="020B0604020202020204" pitchFamily="34" charset="0"/>
+              </a:defRPr>
+            </a:lvl1pPr>
+            <a:lvl2pPr eaLnBrk="0" fontAlgn="base" hangingPunct="0">
+              <a:spcBef>
+                <a:spcPct val="0"/>
+              </a:spcBef>
+              <a:spcAft>
+                <a:spcPct val="0"/>
+              </a:spcAft>
+              <a:defRPr>
+                <a:solidFill>
+                  <a:schemeClr val="tx1"/>
+                </a:solidFill>
+                <a:latin typeface="Arial" panose="020B0604020202020204" pitchFamily="34" charset="0"/>
+              </a:defRPr>
+            </a:lvl2pPr>
+            <a:lvl3pPr eaLnBrk="0" fontAlgn="base" hangingPunct="0">
+              <a:spcBef>
+                <a:spcPct val="0"/>
+              </a:spcBef>
+              <a:spcAft>
+                <a:spcPct val="0"/>
+              </a:spcAft>
+              <a:defRPr>
+                <a:solidFill>
+                  <a:schemeClr val="tx1"/>
+                </a:solidFill>
+                <a:latin typeface="Arial" panose="020B0604020202020204" pitchFamily="34" charset="0"/>
+              </a:defRPr>
+            </a:lvl3pPr>
+            <a:lvl4pPr eaLnBrk="0" fontAlgn="base" hangingPunct="0">
+              <a:spcBef>
+                <a:spcPct val="0"/>
+              </a:spcBef>
+              <a:spcAft>
+                <a:spcPct val="0"/>
+              </a:spcAft>
+              <a:defRPr>
+                <a:solidFill>
+                  <a:schemeClr val="tx1"/>
+                </a:solidFill>
+                <a:latin typeface="Arial" panose="020B0604020202020204" pitchFamily="34" charset="0"/>
+              </a:defRPr>
+            </a:lvl4pPr>
+            <a:lvl5pPr eaLnBrk="0" fontAlgn="base" hangingPunct="0">
+              <a:spcBef>
+                <a:spcPct val="0"/>
+              </a:spcBef>
+              <a:spcAft>
+                <a:spcPct val="0"/>
+              </a:spcAft>
+              <a:defRPr>
+                <a:solidFill>
+                  <a:schemeClr val="tx1"/>
+                </a:solidFill>
+                <a:latin typeface="Arial" panose="020B0604020202020204" pitchFamily="34" charset="0"/>
+              </a:defRPr>
+            </a:lvl5pPr>
+            <a:lvl6pPr eaLnBrk="0" fontAlgn="base" hangingPunct="0">
+              <a:spcBef>
+                <a:spcPct val="0"/>
+              </a:spcBef>
+              <a:spcAft>
+                <a:spcPct val="0"/>
+              </a:spcAft>
+              <a:defRPr>
+                <a:solidFill>
+                  <a:schemeClr val="tx1"/>
+                </a:solidFill>
+                <a:latin typeface="Arial" panose="020B0604020202020204" pitchFamily="34" charset="0"/>
+              </a:defRPr>
+            </a:lvl6pPr>
+            <a:lvl7pPr eaLnBrk="0" fontAlgn="base" hangingPunct="0">
+              <a:spcBef>
+                <a:spcPct val="0"/>
+              </a:spcBef>
+              <a:spcAft>
+                <a:spcPct val="0"/>
+              </a:spcAft>
+              <a:defRPr>
+                <a:solidFill>
+                  <a:schemeClr val="tx1"/>
+                </a:solidFill>
+                <a:latin typeface="Arial" panose="020B0604020202020204" pitchFamily="34" charset="0"/>
+              </a:defRPr>
+            </a:lvl7pPr>
+            <a:lvl8pPr eaLnBrk="0" fontAlgn="base" hangingPunct="0">
+              <a:spcBef>
+                <a:spcPct val="0"/>
+              </a:spcBef>
+              <a:spcAft>
+                <a:spcPct val="0"/>
+              </a:spcAft>
+              <a:defRPr>
+                <a:solidFill>
+                  <a:schemeClr val="tx1"/>
+                </a:solidFill>
+                <a:latin typeface="Arial" panose="020B0604020202020204" pitchFamily="34" charset="0"/>
+              </a:defRPr>
+            </a:lvl8pPr>
+            <a:lvl9pPr eaLnBrk="0" fontAlgn="base" hangingPunct="0">
+              <a:spcBef>
+                <a:spcPct val="0"/>
+              </a:spcBef>
+              <a:spcAft>
+                <a:spcPct val="0"/>
+              </a:spcAft>
+              <a:defRPr>
+                <a:solidFill>
+                  <a:schemeClr val="tx1"/>
+                </a:solidFill>
+                <a:latin typeface="Arial" panose="020B0604020202020204" pitchFamily="34" charset="0"/>
+              </a:defRPr>
+            </a:lvl9pPr>
+          </a:lstStyle>
+          <a:p>
+            <a:pPr algn="ctr">
+              <a:defRPr/>
+            </a:pPr>
+            <a:r>
+              <a:rPr lang="zh-CN" altLang="en-US" sz="1200" b="1" kern="0" dirty="0">
+                <a:solidFill>
+                  <a:srgbClr val="000000"/>
+                </a:solidFill>
+                <a:ea typeface="等线" panose="02010600030101010101" pitchFamily="2" charset="-122"/>
+                <a:cs typeface="Arial" panose="020B0604020202020204" pitchFamily="34" charset="0"/>
+              </a:rPr>
+              <a:t>笔记本电脑</a:t>
+            </a:r>
+            <a:endParaRPr lang="zh-CN" altLang="zh-CN" sz="1200" b="1" kern="0" dirty="0">
+              <a:solidFill>
+                <a:srgbClr val="000000"/>
+              </a:solidFill>
+              <a:ea typeface="等线" panose="02010600030101010101" pitchFamily="2" charset="-122"/>
+              <a:cs typeface="Arial" panose="020B0604020202020204" pitchFamily="34" charset="0"/>
+            </a:endParaRPr>
+          </a:p>
+        </p:txBody>
+      </p:sp>
+      <p:cxnSp>
+        <p:nvCxnSpPr>
+          <p:cNvPr id="20" name="连接符: 肘形 19">
+            <a:extLst>
+              <a:ext uri="{FF2B5EF4-FFF2-40B4-BE49-F238E27FC236}">
+                <a16:creationId xmlns:a16="http://schemas.microsoft.com/office/drawing/2014/main" id="{0265F482-2FCC-46EC-81B0-BFD3604527F6}"/>
+              </a:ext>
+            </a:extLst>
+          </p:cNvPr>
+          <p:cNvCxnSpPr>
+            <a:stCxn id="11" idx="1"/>
+            <a:endCxn id="16" idx="2"/>
+          </p:cNvCxnSpPr>
+          <p:nvPr/>
+        </p:nvCxnSpPr>
+        <p:spPr>
+          <a:xfrm rot="10800000">
+            <a:off x="3122676" y="4754880"/>
+            <a:ext cx="2396750" cy="260920"/>
+          </a:xfrm>
+          <a:prstGeom prst="bentConnector2">
+            <a:avLst/>
+          </a:prstGeom>
+          <a:ln w="25400">
+            <a:solidFill>
+              <a:srgbClr val="3D6BB6"/>
+            </a:solidFill>
+            <a:tailEnd type="triangle"/>
+          </a:ln>
+        </p:spPr>
+        <p:style>
+          <a:lnRef idx="1">
+            <a:schemeClr val="accent1"/>
+          </a:lnRef>
+          <a:fillRef idx="0">
+            <a:schemeClr val="accent1"/>
+          </a:fillRef>
+          <a:effectRef idx="0">
+            <a:schemeClr val="accent1"/>
+          </a:effectRef>
+          <a:fontRef idx="minor">
+            <a:schemeClr val="tx1"/>
+          </a:fontRef>
+        </p:style>
+      </p:cxnSp>
+      <p:sp>
+        <p:nvSpPr>
+          <p:cNvPr id="21" name="Rectangle 28">
+            <a:extLst>
+              <a:ext uri="{FF2B5EF4-FFF2-40B4-BE49-F238E27FC236}">
+                <a16:creationId xmlns:a16="http://schemas.microsoft.com/office/drawing/2014/main" id="{E32A4498-2BDF-4E7D-BB44-78F6EBA7A928}"/>
+              </a:ext>
+            </a:extLst>
+          </p:cNvPr>
+          <p:cNvSpPr>
+            <a:spLocks noChangeArrowheads="1"/>
+          </p:cNvSpPr>
+          <p:nvPr/>
+        </p:nvSpPr>
+        <p:spPr bwMode="auto">
+          <a:xfrm>
+            <a:off x="3293658" y="5047225"/>
+            <a:ext cx="1740862" cy="169277"/>
+          </a:xfrm>
+          <a:prstGeom prst="rect">
+            <a:avLst/>
+          </a:prstGeom>
+          <a:noFill/>
+          <a:ln>
+            <a:noFill/>
+          </a:ln>
+          <a:extLst>
+            <a:ext uri="{909E8E84-426E-40DD-AFC4-6F175D3DCCD1}">
+              <a14:hiddenFill xmlns:a14="http://schemas.microsoft.com/office/drawing/2010/main">
+                <a:solidFill>
+                  <a:srgbClr val="FFFFFF"/>
+                </a:solidFill>
+              </a14:hiddenFill>
+            </a:ext>
+            <a:ext uri="{91240B29-F687-4F45-9708-019B960494DF}">
+              <a14:hiddenLine xmlns:a14="http://schemas.microsoft.com/office/drawing/2010/main" w="9525">
+                <a:solidFill>
+                  <a:srgbClr val="000000"/>
+                </a:solidFill>
+                <a:miter lim="800000"/>
+                <a:headEnd/>
+                <a:tailEnd/>
+              </a14:hiddenLine>
+            </a:ext>
+          </a:extLst>
+        </p:spPr>
+        <p:txBody>
+          <a:bodyPr vert="horz" wrap="none" lIns="0" tIns="0" rIns="0" bIns="0" numCol="1" anchor="t" anchorCtr="0" compatLnSpc="1">
+            <a:prstTxWarp prst="textNoShape">
+              <a:avLst/>
+            </a:prstTxWarp>
+            <a:spAutoFit/>
+          </a:bodyPr>
+          <a:lstStyle>
+            <a:lvl1pPr eaLnBrk="0" fontAlgn="base" hangingPunct="0">
+              <a:spcBef>
+                <a:spcPct val="0"/>
+              </a:spcBef>
+              <a:spcAft>
+                <a:spcPct val="0"/>
+              </a:spcAft>
+              <a:defRPr>
+                <a:solidFill>
+                  <a:schemeClr val="tx1"/>
+                </a:solidFill>
+                <a:latin typeface="Arial" panose="020B0604020202020204" pitchFamily="34" charset="0"/>
+              </a:defRPr>
+            </a:lvl1pPr>
+            <a:lvl2pPr eaLnBrk="0" fontAlgn="base" hangingPunct="0">
+              <a:spcBef>
+                <a:spcPct val="0"/>
+              </a:spcBef>
+              <a:spcAft>
+                <a:spcPct val="0"/>
+              </a:spcAft>
+              <a:defRPr>
+                <a:solidFill>
+                  <a:schemeClr val="tx1"/>
+                </a:solidFill>
+                <a:latin typeface="Arial" panose="020B0604020202020204" pitchFamily="34" charset="0"/>
+              </a:defRPr>
+            </a:lvl2pPr>
+            <a:lvl3pPr eaLnBrk="0" fontAlgn="base" hangingPunct="0">
+              <a:spcBef>
+                <a:spcPct val="0"/>
+              </a:spcBef>
+              <a:spcAft>
+                <a:spcPct val="0"/>
+              </a:spcAft>
+              <a:defRPr>
+                <a:solidFill>
+                  <a:schemeClr val="tx1"/>
+                </a:solidFill>
+                <a:latin typeface="Arial" panose="020B0604020202020204" pitchFamily="34" charset="0"/>
+              </a:defRPr>
+            </a:lvl3pPr>
+            <a:lvl4pPr eaLnBrk="0" fontAlgn="base" hangingPunct="0">
+              <a:spcBef>
+                <a:spcPct val="0"/>
+              </a:spcBef>
+              <a:spcAft>
+                <a:spcPct val="0"/>
+              </a:spcAft>
+              <a:defRPr>
+                <a:solidFill>
+                  <a:schemeClr val="tx1"/>
+                </a:solidFill>
+                <a:latin typeface="Arial" panose="020B0604020202020204" pitchFamily="34" charset="0"/>
+              </a:defRPr>
+            </a:lvl4pPr>
+            <a:lvl5pPr eaLnBrk="0" fontAlgn="base" hangingPunct="0">
+              <a:spcBef>
+                <a:spcPct val="0"/>
+              </a:spcBef>
+              <a:spcAft>
+                <a:spcPct val="0"/>
+              </a:spcAft>
+              <a:defRPr>
+                <a:solidFill>
+                  <a:schemeClr val="tx1"/>
+                </a:solidFill>
+                <a:latin typeface="Arial" panose="020B0604020202020204" pitchFamily="34" charset="0"/>
+              </a:defRPr>
+            </a:lvl5pPr>
+            <a:lvl6pPr eaLnBrk="0" fontAlgn="base" hangingPunct="0">
+              <a:spcBef>
+                <a:spcPct val="0"/>
+              </a:spcBef>
+              <a:spcAft>
+                <a:spcPct val="0"/>
+              </a:spcAft>
+              <a:defRPr>
+                <a:solidFill>
+                  <a:schemeClr val="tx1"/>
+                </a:solidFill>
+                <a:latin typeface="Arial" panose="020B0604020202020204" pitchFamily="34" charset="0"/>
+              </a:defRPr>
+            </a:lvl6pPr>
+            <a:lvl7pPr eaLnBrk="0" fontAlgn="base" hangingPunct="0">
+              <a:spcBef>
+                <a:spcPct val="0"/>
+              </a:spcBef>
+              <a:spcAft>
+                <a:spcPct val="0"/>
+              </a:spcAft>
+              <a:defRPr>
+                <a:solidFill>
+                  <a:schemeClr val="tx1"/>
+                </a:solidFill>
+                <a:latin typeface="Arial" panose="020B0604020202020204" pitchFamily="34" charset="0"/>
+              </a:defRPr>
+            </a:lvl7pPr>
+            <a:lvl8pPr eaLnBrk="0" fontAlgn="base" hangingPunct="0">
+              <a:spcBef>
+                <a:spcPct val="0"/>
+              </a:spcBef>
+              <a:spcAft>
+                <a:spcPct val="0"/>
+              </a:spcAft>
+              <a:defRPr>
+                <a:solidFill>
+                  <a:schemeClr val="tx1"/>
+                </a:solidFill>
+                <a:latin typeface="Arial" panose="020B0604020202020204" pitchFamily="34" charset="0"/>
+              </a:defRPr>
+            </a:lvl8pPr>
+            <a:lvl9pPr eaLnBrk="0" fontAlgn="base" hangingPunct="0">
+              <a:spcBef>
+                <a:spcPct val="0"/>
+              </a:spcBef>
+              <a:spcAft>
+                <a:spcPct val="0"/>
+              </a:spcAft>
+              <a:defRPr>
+                <a:solidFill>
+                  <a:schemeClr val="tx1"/>
+                </a:solidFill>
+                <a:latin typeface="Arial" panose="020B0604020202020204" pitchFamily="34" charset="0"/>
+              </a:defRPr>
+            </a:lvl9pPr>
+          </a:lstStyle>
+          <a:p>
+            <a:pPr algn="ctr">
+              <a:defRPr/>
+            </a:pPr>
+            <a:r>
+              <a:rPr lang="zh-CN" altLang="en-US" sz="1100" kern="0" dirty="0">
+                <a:solidFill>
+                  <a:srgbClr val="000000"/>
+                </a:solidFill>
+                <a:ea typeface="等线" panose="02010600030101010101" pitchFamily="2" charset="-122"/>
+                <a:cs typeface="Arial" panose="020B0604020202020204" pitchFamily="34" charset="0"/>
+              </a:rPr>
+              <a:t>使用</a:t>
+            </a:r>
+            <a:r>
+              <a:rPr lang="en-US" altLang="zh-CN" sz="1100" kern="0" dirty="0">
+                <a:solidFill>
+                  <a:srgbClr val="000000"/>
+                </a:solidFill>
+                <a:ea typeface="等线" panose="02010600030101010101" pitchFamily="2" charset="-122"/>
+                <a:cs typeface="Arial" panose="020B0604020202020204" pitchFamily="34" charset="0"/>
+              </a:rPr>
+              <a:t>IEC104</a:t>
+            </a:r>
+            <a:r>
+              <a:rPr lang="zh-CN" altLang="en-US" sz="1100" kern="0" dirty="0">
+                <a:solidFill>
+                  <a:srgbClr val="000000"/>
+                </a:solidFill>
+                <a:ea typeface="等线" panose="02010600030101010101" pitchFamily="2" charset="-122"/>
+                <a:cs typeface="Arial" panose="020B0604020202020204" pitchFamily="34" charset="0"/>
+              </a:rPr>
+              <a:t>模拟器模拟电表</a:t>
+            </a:r>
+            <a:endParaRPr lang="zh-CN" altLang="zh-CN" sz="1100" kern="0" dirty="0">
+              <a:solidFill>
+                <a:srgbClr val="000000"/>
+              </a:solidFill>
+              <a:ea typeface="等线" panose="02010600030101010101" pitchFamily="2" charset="-122"/>
+              <a:cs typeface="Arial" panose="020B0604020202020204" pitchFamily="34" charset="0"/>
+            </a:endParaRPr>
+          </a:p>
+        </p:txBody>
+      </p:sp>
+      <p:cxnSp>
+        <p:nvCxnSpPr>
+          <p:cNvPr id="23" name="连接符: 肘形 22">
+            <a:extLst>
+              <a:ext uri="{FF2B5EF4-FFF2-40B4-BE49-F238E27FC236}">
+                <a16:creationId xmlns:a16="http://schemas.microsoft.com/office/drawing/2014/main" id="{949BB1FF-62EA-43AF-B80B-62B9F26CC548}"/>
+              </a:ext>
+            </a:extLst>
+          </p:cNvPr>
+          <p:cNvCxnSpPr>
+            <a:stCxn id="11" idx="3"/>
+            <a:endCxn id="13" idx="2"/>
+          </p:cNvCxnSpPr>
+          <p:nvPr/>
+        </p:nvCxnSpPr>
+        <p:spPr>
+          <a:xfrm flipV="1">
+            <a:off x="6507981" y="3567948"/>
+            <a:ext cx="2138637" cy="1447852"/>
+          </a:xfrm>
+          <a:prstGeom prst="bentConnector2">
+            <a:avLst/>
+          </a:prstGeom>
+          <a:ln w="25400">
+            <a:solidFill>
+              <a:srgbClr val="3D6BB6"/>
+            </a:solidFill>
+            <a:tailEnd type="triangle"/>
+          </a:ln>
+        </p:spPr>
+        <p:style>
+          <a:lnRef idx="1">
+            <a:schemeClr val="accent1"/>
+          </a:lnRef>
+          <a:fillRef idx="0">
+            <a:schemeClr val="accent1"/>
+          </a:fillRef>
+          <a:effectRef idx="0">
+            <a:schemeClr val="accent1"/>
+          </a:effectRef>
+          <a:fontRef idx="minor">
+            <a:schemeClr val="tx1"/>
+          </a:fontRef>
+        </p:style>
+      </p:cxnSp>
+      <p:sp>
+        <p:nvSpPr>
+          <p:cNvPr id="24" name="Rectangle 28">
+            <a:extLst>
+              <a:ext uri="{FF2B5EF4-FFF2-40B4-BE49-F238E27FC236}">
+                <a16:creationId xmlns:a16="http://schemas.microsoft.com/office/drawing/2014/main" id="{70529D7C-96AD-43E8-8102-BE97079F0FA1}"/>
+              </a:ext>
+            </a:extLst>
+          </p:cNvPr>
+          <p:cNvSpPr>
+            <a:spLocks noChangeArrowheads="1"/>
+          </p:cNvSpPr>
+          <p:nvPr/>
+        </p:nvSpPr>
+        <p:spPr bwMode="auto">
+          <a:xfrm>
+            <a:off x="6768767" y="5047225"/>
+            <a:ext cx="1835439" cy="169277"/>
+          </a:xfrm>
+          <a:prstGeom prst="rect">
+            <a:avLst/>
+          </a:prstGeom>
+          <a:noFill/>
+          <a:ln>
+            <a:noFill/>
+          </a:ln>
+          <a:extLst>
+            <a:ext uri="{909E8E84-426E-40DD-AFC4-6F175D3DCCD1}">
+              <a14:hiddenFill xmlns:a14="http://schemas.microsoft.com/office/drawing/2010/main">
+                <a:solidFill>
+                  <a:srgbClr val="FFFFFF"/>
+                </a:solidFill>
+              </a14:hiddenFill>
+            </a:ext>
+            <a:ext uri="{91240B29-F687-4F45-9708-019B960494DF}">
+              <a14:hiddenLine xmlns:a14="http://schemas.microsoft.com/office/drawing/2010/main" w="9525">
+                <a:solidFill>
+                  <a:srgbClr val="000000"/>
+                </a:solidFill>
+                <a:miter lim="800000"/>
+                <a:headEnd/>
+                <a:tailEnd/>
+              </a14:hiddenLine>
+            </a:ext>
+          </a:extLst>
+        </p:spPr>
+        <p:txBody>
+          <a:bodyPr vert="horz" wrap="none" lIns="0" tIns="0" rIns="0" bIns="0" numCol="1" anchor="t" anchorCtr="0" compatLnSpc="1">
+            <a:prstTxWarp prst="textNoShape">
+              <a:avLst/>
+            </a:prstTxWarp>
+            <a:spAutoFit/>
+          </a:bodyPr>
+          <a:lstStyle>
+            <a:lvl1pPr eaLnBrk="0" fontAlgn="base" hangingPunct="0">
+              <a:spcBef>
+                <a:spcPct val="0"/>
+              </a:spcBef>
+              <a:spcAft>
+                <a:spcPct val="0"/>
+              </a:spcAft>
+              <a:defRPr>
+                <a:solidFill>
+                  <a:schemeClr val="tx1"/>
+                </a:solidFill>
+                <a:latin typeface="Arial" panose="020B0604020202020204" pitchFamily="34" charset="0"/>
+              </a:defRPr>
+            </a:lvl1pPr>
+            <a:lvl2pPr eaLnBrk="0" fontAlgn="base" hangingPunct="0">
+              <a:spcBef>
+                <a:spcPct val="0"/>
+              </a:spcBef>
+              <a:spcAft>
+                <a:spcPct val="0"/>
+              </a:spcAft>
+              <a:defRPr>
+                <a:solidFill>
+                  <a:schemeClr val="tx1"/>
+                </a:solidFill>
+                <a:latin typeface="Arial" panose="020B0604020202020204" pitchFamily="34" charset="0"/>
+              </a:defRPr>
+            </a:lvl2pPr>
+            <a:lvl3pPr eaLnBrk="0" fontAlgn="base" hangingPunct="0">
+              <a:spcBef>
+                <a:spcPct val="0"/>
+              </a:spcBef>
+              <a:spcAft>
+                <a:spcPct val="0"/>
+              </a:spcAft>
+              <a:defRPr>
+                <a:solidFill>
+                  <a:schemeClr val="tx1"/>
+                </a:solidFill>
+                <a:latin typeface="Arial" panose="020B0604020202020204" pitchFamily="34" charset="0"/>
+              </a:defRPr>
+            </a:lvl3pPr>
+            <a:lvl4pPr eaLnBrk="0" fontAlgn="base" hangingPunct="0">
+              <a:spcBef>
+                <a:spcPct val="0"/>
+              </a:spcBef>
+              <a:spcAft>
+                <a:spcPct val="0"/>
+              </a:spcAft>
+              <a:defRPr>
+                <a:solidFill>
+                  <a:schemeClr val="tx1"/>
+                </a:solidFill>
+                <a:latin typeface="Arial" panose="020B0604020202020204" pitchFamily="34" charset="0"/>
+              </a:defRPr>
+            </a:lvl4pPr>
+            <a:lvl5pPr eaLnBrk="0" fontAlgn="base" hangingPunct="0">
+              <a:spcBef>
+                <a:spcPct val="0"/>
+              </a:spcBef>
+              <a:spcAft>
+                <a:spcPct val="0"/>
+              </a:spcAft>
+              <a:defRPr>
+                <a:solidFill>
+                  <a:schemeClr val="tx1"/>
+                </a:solidFill>
+                <a:latin typeface="Arial" panose="020B0604020202020204" pitchFamily="34" charset="0"/>
+              </a:defRPr>
+            </a:lvl5pPr>
+            <a:lvl6pPr eaLnBrk="0" fontAlgn="base" hangingPunct="0">
+              <a:spcBef>
+                <a:spcPct val="0"/>
+              </a:spcBef>
+              <a:spcAft>
+                <a:spcPct val="0"/>
+              </a:spcAft>
+              <a:defRPr>
+                <a:solidFill>
+                  <a:schemeClr val="tx1"/>
+                </a:solidFill>
+                <a:latin typeface="Arial" panose="020B0604020202020204" pitchFamily="34" charset="0"/>
+              </a:defRPr>
+            </a:lvl6pPr>
+            <a:lvl7pPr eaLnBrk="0" fontAlgn="base" hangingPunct="0">
+              <a:spcBef>
+                <a:spcPct val="0"/>
+              </a:spcBef>
+              <a:spcAft>
+                <a:spcPct val="0"/>
+              </a:spcAft>
+              <a:defRPr>
+                <a:solidFill>
+                  <a:schemeClr val="tx1"/>
+                </a:solidFill>
+                <a:latin typeface="Arial" panose="020B0604020202020204" pitchFamily="34" charset="0"/>
+              </a:defRPr>
+            </a:lvl7pPr>
+            <a:lvl8pPr eaLnBrk="0" fontAlgn="base" hangingPunct="0">
+              <a:spcBef>
+                <a:spcPct val="0"/>
+              </a:spcBef>
+              <a:spcAft>
+                <a:spcPct val="0"/>
+              </a:spcAft>
+              <a:defRPr>
+                <a:solidFill>
+                  <a:schemeClr val="tx1"/>
+                </a:solidFill>
+                <a:latin typeface="Arial" panose="020B0604020202020204" pitchFamily="34" charset="0"/>
+              </a:defRPr>
+            </a:lvl8pPr>
+            <a:lvl9pPr eaLnBrk="0" fontAlgn="base" hangingPunct="0">
+              <a:spcBef>
+                <a:spcPct val="0"/>
+              </a:spcBef>
+              <a:spcAft>
+                <a:spcPct val="0"/>
+              </a:spcAft>
+              <a:defRPr>
+                <a:solidFill>
+                  <a:schemeClr val="tx1"/>
+                </a:solidFill>
+                <a:latin typeface="Arial" panose="020B0604020202020204" pitchFamily="34" charset="0"/>
+              </a:defRPr>
+            </a:lvl9pPr>
+          </a:lstStyle>
+          <a:p>
+            <a:pPr algn="ctr">
+              <a:defRPr/>
+            </a:pPr>
+            <a:r>
+              <a:rPr lang="zh-CN" altLang="en-US" sz="1100" kern="0" dirty="0">
+                <a:solidFill>
+                  <a:srgbClr val="000000"/>
+                </a:solidFill>
+                <a:ea typeface="等线" panose="02010600030101010101" pitchFamily="2" charset="-122"/>
+                <a:cs typeface="Arial" panose="020B0604020202020204" pitchFamily="34" charset="0"/>
+              </a:rPr>
+              <a:t>登录</a:t>
+            </a:r>
+            <a:r>
+              <a:rPr lang="en-US" altLang="zh-CN" sz="1100" kern="0" dirty="0" err="1" smtClean="0">
+                <a:solidFill>
+                  <a:srgbClr val="000000"/>
+                </a:solidFill>
+                <a:ea typeface="等线" panose="02010600030101010101" pitchFamily="2" charset="-122"/>
+                <a:cs typeface="Arial" panose="020B0604020202020204" pitchFamily="34" charset="0"/>
+              </a:rPr>
+              <a:t>EnOS</a:t>
+            </a:r>
+            <a:r>
+              <a:rPr lang="zh-CN" altLang="en-US" sz="1100" kern="0" dirty="0">
+                <a:solidFill>
+                  <a:srgbClr val="000000"/>
+                </a:solidFill>
+                <a:ea typeface="等线" panose="02010600030101010101" pitchFamily="2" charset="-122"/>
+                <a:cs typeface="Arial" panose="020B0604020202020204" pitchFamily="34" charset="0"/>
+              </a:rPr>
+              <a:t>以配置</a:t>
+            </a:r>
+            <a:r>
+              <a:rPr lang="en-US" altLang="zh-CN" sz="1100" kern="0" dirty="0">
+                <a:solidFill>
+                  <a:srgbClr val="000000"/>
+                </a:solidFill>
+                <a:ea typeface="等线" panose="02010600030101010101" pitchFamily="2" charset="-122"/>
+                <a:cs typeface="Arial" panose="020B0604020202020204" pitchFamily="34" charset="0"/>
+              </a:rPr>
+              <a:t>Edge</a:t>
+            </a:r>
+            <a:r>
+              <a:rPr lang="zh-CN" altLang="en-US" sz="1100" kern="0" dirty="0" smtClean="0">
+                <a:solidFill>
+                  <a:srgbClr val="000000"/>
+                </a:solidFill>
+                <a:ea typeface="等线" panose="02010600030101010101" pitchFamily="2" charset="-122"/>
+                <a:cs typeface="Arial" panose="020B0604020202020204" pitchFamily="34" charset="0"/>
+              </a:rPr>
+              <a:t>和电表</a:t>
+            </a:r>
+            <a:endParaRPr lang="zh-CN" altLang="zh-CN" sz="1100" kern="0" dirty="0">
+              <a:solidFill>
+                <a:srgbClr val="000000"/>
+              </a:solidFill>
+              <a:ea typeface="等线" panose="02010600030101010101" pitchFamily="2" charset="-122"/>
+              <a:cs typeface="Arial" panose="020B0604020202020204" pitchFamily="34" charset="0"/>
+            </a:endParaRPr>
+          </a:p>
+        </p:txBody>
+      </p:sp>
+      <p:cxnSp>
+        <p:nvCxnSpPr>
+          <p:cNvPr id="26" name="直接箭头连接符 25">
+            <a:extLst>
+              <a:ext uri="{FF2B5EF4-FFF2-40B4-BE49-F238E27FC236}">
+                <a16:creationId xmlns:a16="http://schemas.microsoft.com/office/drawing/2014/main" id="{491C8741-4B29-4027-9CE1-42526CDF85B4}"/>
+              </a:ext>
+            </a:extLst>
+          </p:cNvPr>
+          <p:cNvCxnSpPr>
+            <a:cxnSpLocks/>
+            <a:stCxn id="5" idx="30"/>
+          </p:cNvCxnSpPr>
+          <p:nvPr/>
+        </p:nvCxnSpPr>
+        <p:spPr>
+          <a:xfrm>
+            <a:off x="6507981" y="3004908"/>
+            <a:ext cx="1682078" cy="8984"/>
+          </a:xfrm>
+          <a:prstGeom prst="straightConnector1">
+            <a:avLst/>
+          </a:prstGeom>
+          <a:ln w="25400">
+            <a:solidFill>
+              <a:srgbClr val="3D6BB6"/>
+            </a:solidFill>
+            <a:tailEnd type="triangle"/>
+          </a:ln>
+        </p:spPr>
+        <p:style>
+          <a:lnRef idx="1">
+            <a:schemeClr val="accent1"/>
+          </a:lnRef>
+          <a:fillRef idx="0">
+            <a:schemeClr val="accent1"/>
+          </a:fillRef>
+          <a:effectRef idx="0">
+            <a:schemeClr val="accent1"/>
+          </a:effectRef>
+          <a:fontRef idx="minor">
+            <a:schemeClr val="tx1"/>
+          </a:fontRef>
+        </p:style>
+      </p:cxnSp>
+      <p:sp>
+        <p:nvSpPr>
+          <p:cNvPr id="28" name="Rectangle 28">
+            <a:extLst>
+              <a:ext uri="{FF2B5EF4-FFF2-40B4-BE49-F238E27FC236}">
+                <a16:creationId xmlns:a16="http://schemas.microsoft.com/office/drawing/2014/main" id="{E689108C-A540-45BC-B41A-1EF9B5AF65CE}"/>
+              </a:ext>
+            </a:extLst>
+          </p:cNvPr>
+          <p:cNvSpPr>
+            <a:spLocks noChangeArrowheads="1"/>
+          </p:cNvSpPr>
+          <p:nvPr/>
+        </p:nvSpPr>
+        <p:spPr bwMode="auto">
+          <a:xfrm>
+            <a:off x="7042921" y="2825395"/>
+            <a:ext cx="705321" cy="169277"/>
+          </a:xfrm>
+          <a:prstGeom prst="rect">
+            <a:avLst/>
+          </a:prstGeom>
+          <a:noFill/>
+          <a:ln>
+            <a:noFill/>
+          </a:ln>
+          <a:extLst>
+            <a:ext uri="{909E8E84-426E-40DD-AFC4-6F175D3DCCD1}">
+              <a14:hiddenFill xmlns:a14="http://schemas.microsoft.com/office/drawing/2010/main">
+                <a:solidFill>
+                  <a:srgbClr val="FFFFFF"/>
+                </a:solidFill>
+              </a14:hiddenFill>
+            </a:ext>
+            <a:ext uri="{91240B29-F687-4F45-9708-019B960494DF}">
+              <a14:hiddenLine xmlns:a14="http://schemas.microsoft.com/office/drawing/2010/main" w="9525">
+                <a:solidFill>
+                  <a:srgbClr val="000000"/>
+                </a:solidFill>
+                <a:miter lim="800000"/>
+                <a:headEnd/>
+                <a:tailEnd/>
+              </a14:hiddenLine>
+            </a:ext>
+          </a:extLst>
+        </p:spPr>
+        <p:txBody>
+          <a:bodyPr vert="horz" wrap="none" lIns="0" tIns="0" rIns="0" bIns="0" numCol="1" anchor="t" anchorCtr="0" compatLnSpc="1">
+            <a:prstTxWarp prst="textNoShape">
+              <a:avLst/>
+            </a:prstTxWarp>
+            <a:spAutoFit/>
+          </a:bodyPr>
+          <a:lstStyle>
+            <a:lvl1pPr eaLnBrk="0" fontAlgn="base" hangingPunct="0">
+              <a:spcBef>
+                <a:spcPct val="0"/>
+              </a:spcBef>
+              <a:spcAft>
+                <a:spcPct val="0"/>
+              </a:spcAft>
+              <a:defRPr>
+                <a:solidFill>
+                  <a:schemeClr val="tx1"/>
+                </a:solidFill>
+                <a:latin typeface="Arial" panose="020B0604020202020204" pitchFamily="34" charset="0"/>
+              </a:defRPr>
+            </a:lvl1pPr>
+            <a:lvl2pPr eaLnBrk="0" fontAlgn="base" hangingPunct="0">
+              <a:spcBef>
+                <a:spcPct val="0"/>
+              </a:spcBef>
+              <a:spcAft>
+                <a:spcPct val="0"/>
+              </a:spcAft>
+              <a:defRPr>
+                <a:solidFill>
+                  <a:schemeClr val="tx1"/>
+                </a:solidFill>
+                <a:latin typeface="Arial" panose="020B0604020202020204" pitchFamily="34" charset="0"/>
+              </a:defRPr>
+            </a:lvl2pPr>
+            <a:lvl3pPr eaLnBrk="0" fontAlgn="base" hangingPunct="0">
+              <a:spcBef>
+                <a:spcPct val="0"/>
+              </a:spcBef>
+              <a:spcAft>
+                <a:spcPct val="0"/>
+              </a:spcAft>
+              <a:defRPr>
+                <a:solidFill>
+                  <a:schemeClr val="tx1"/>
+                </a:solidFill>
+                <a:latin typeface="Arial" panose="020B0604020202020204" pitchFamily="34" charset="0"/>
+              </a:defRPr>
+            </a:lvl3pPr>
+            <a:lvl4pPr eaLnBrk="0" fontAlgn="base" hangingPunct="0">
+              <a:spcBef>
+                <a:spcPct val="0"/>
+              </a:spcBef>
+              <a:spcAft>
+                <a:spcPct val="0"/>
+              </a:spcAft>
+              <a:defRPr>
+                <a:solidFill>
+                  <a:schemeClr val="tx1"/>
+                </a:solidFill>
+                <a:latin typeface="Arial" panose="020B0604020202020204" pitchFamily="34" charset="0"/>
+              </a:defRPr>
+            </a:lvl4pPr>
+            <a:lvl5pPr eaLnBrk="0" fontAlgn="base" hangingPunct="0">
+              <a:spcBef>
+                <a:spcPct val="0"/>
+              </a:spcBef>
+              <a:spcAft>
+                <a:spcPct val="0"/>
+              </a:spcAft>
+              <a:defRPr>
+                <a:solidFill>
+                  <a:schemeClr val="tx1"/>
+                </a:solidFill>
+                <a:latin typeface="Arial" panose="020B0604020202020204" pitchFamily="34" charset="0"/>
+              </a:defRPr>
+            </a:lvl5pPr>
+            <a:lvl6pPr eaLnBrk="0" fontAlgn="base" hangingPunct="0">
+              <a:spcBef>
+                <a:spcPct val="0"/>
+              </a:spcBef>
+              <a:spcAft>
+                <a:spcPct val="0"/>
+              </a:spcAft>
+              <a:defRPr>
+                <a:solidFill>
+                  <a:schemeClr val="tx1"/>
+                </a:solidFill>
+                <a:latin typeface="Arial" panose="020B0604020202020204" pitchFamily="34" charset="0"/>
+              </a:defRPr>
+            </a:lvl6pPr>
+            <a:lvl7pPr eaLnBrk="0" fontAlgn="base" hangingPunct="0">
+              <a:spcBef>
+                <a:spcPct val="0"/>
+              </a:spcBef>
+              <a:spcAft>
+                <a:spcPct val="0"/>
+              </a:spcAft>
+              <a:defRPr>
+                <a:solidFill>
+                  <a:schemeClr val="tx1"/>
+                </a:solidFill>
+                <a:latin typeface="Arial" panose="020B0604020202020204" pitchFamily="34" charset="0"/>
+              </a:defRPr>
+            </a:lvl7pPr>
+            <a:lvl8pPr eaLnBrk="0" fontAlgn="base" hangingPunct="0">
+              <a:spcBef>
+                <a:spcPct val="0"/>
+              </a:spcBef>
+              <a:spcAft>
+                <a:spcPct val="0"/>
+              </a:spcAft>
+              <a:defRPr>
+                <a:solidFill>
+                  <a:schemeClr val="tx1"/>
+                </a:solidFill>
+                <a:latin typeface="Arial" panose="020B0604020202020204" pitchFamily="34" charset="0"/>
+              </a:defRPr>
+            </a:lvl8pPr>
+            <a:lvl9pPr eaLnBrk="0" fontAlgn="base" hangingPunct="0">
+              <a:spcBef>
+                <a:spcPct val="0"/>
+              </a:spcBef>
+              <a:spcAft>
+                <a:spcPct val="0"/>
+              </a:spcAft>
+              <a:defRPr>
+                <a:solidFill>
+                  <a:schemeClr val="tx1"/>
+                </a:solidFill>
+                <a:latin typeface="Arial" panose="020B0604020202020204" pitchFamily="34" charset="0"/>
+              </a:defRPr>
+            </a:lvl9pPr>
+          </a:lstStyle>
+          <a:p>
+            <a:pPr algn="ctr">
+              <a:defRPr/>
+            </a:pPr>
+            <a:r>
+              <a:rPr lang="zh-CN" altLang="en-US" sz="1100" kern="0" dirty="0">
+                <a:solidFill>
+                  <a:srgbClr val="000000"/>
+                </a:solidFill>
+                <a:ea typeface="等线" panose="02010600030101010101" pitchFamily="2" charset="-122"/>
+                <a:cs typeface="Arial" panose="020B0604020202020204" pitchFamily="34" charset="0"/>
+              </a:rPr>
+              <a:t>发送数据至</a:t>
+            </a:r>
+            <a:endParaRPr lang="zh-CN" altLang="zh-CN" sz="1100" kern="0" dirty="0">
+              <a:solidFill>
+                <a:srgbClr val="000000"/>
+              </a:solidFill>
+              <a:ea typeface="等线" panose="02010600030101010101" pitchFamily="2" charset="-122"/>
+              <a:cs typeface="Arial" panose="020B0604020202020204" pitchFamily="34" charset="0"/>
+            </a:endParaRPr>
+          </a:p>
+        </p:txBody>
+      </p:sp>
+      <p:cxnSp>
+        <p:nvCxnSpPr>
+          <p:cNvPr id="30" name="直接箭头连接符 29">
+            <a:extLst>
+              <a:ext uri="{FF2B5EF4-FFF2-40B4-BE49-F238E27FC236}">
+                <a16:creationId xmlns:a16="http://schemas.microsoft.com/office/drawing/2014/main" id="{A99C372E-0EAC-4901-94E8-9EF769CA8637}"/>
+              </a:ext>
+            </a:extLst>
+          </p:cNvPr>
+          <p:cNvCxnSpPr>
+            <a:cxnSpLocks/>
+            <a:stCxn id="16" idx="3"/>
+            <a:endCxn id="5" idx="34"/>
+          </p:cNvCxnSpPr>
+          <p:nvPr/>
+        </p:nvCxnSpPr>
+        <p:spPr>
+          <a:xfrm flipV="1">
+            <a:off x="4114800" y="3004908"/>
+            <a:ext cx="1404626" cy="3468"/>
+          </a:xfrm>
+          <a:prstGeom prst="straightConnector1">
+            <a:avLst/>
+          </a:prstGeom>
+          <a:ln w="25400">
+            <a:solidFill>
+              <a:srgbClr val="3D6BB6"/>
+            </a:solidFill>
+            <a:headEnd type="triangle"/>
+            <a:tailEnd type="none"/>
+          </a:ln>
+        </p:spPr>
+        <p:style>
+          <a:lnRef idx="1">
+            <a:schemeClr val="accent1"/>
+          </a:lnRef>
+          <a:fillRef idx="0">
+            <a:schemeClr val="accent1"/>
+          </a:fillRef>
+          <a:effectRef idx="0">
+            <a:schemeClr val="accent1"/>
+          </a:effectRef>
+          <a:fontRef idx="minor">
+            <a:schemeClr val="tx1"/>
+          </a:fontRef>
+        </p:style>
+      </p:cxnSp>
+      <p:sp>
+        <p:nvSpPr>
+          <p:cNvPr id="33" name="Rectangle 28">
+            <a:extLst>
+              <a:ext uri="{FF2B5EF4-FFF2-40B4-BE49-F238E27FC236}">
+                <a16:creationId xmlns:a16="http://schemas.microsoft.com/office/drawing/2014/main" id="{3C7C4414-2590-4956-B21A-315AD3D0B1A1}"/>
+              </a:ext>
+            </a:extLst>
+          </p:cNvPr>
+          <p:cNvSpPr>
+            <a:spLocks noChangeArrowheads="1"/>
+          </p:cNvSpPr>
+          <p:nvPr/>
+        </p:nvSpPr>
+        <p:spPr bwMode="auto">
+          <a:xfrm>
+            <a:off x="4381602" y="2829481"/>
+            <a:ext cx="846386" cy="169277"/>
+          </a:xfrm>
+          <a:prstGeom prst="rect">
+            <a:avLst/>
+          </a:prstGeom>
+          <a:noFill/>
+          <a:ln>
+            <a:noFill/>
+          </a:ln>
+          <a:extLst>
+            <a:ext uri="{909E8E84-426E-40DD-AFC4-6F175D3DCCD1}">
+              <a14:hiddenFill xmlns:a14="http://schemas.microsoft.com/office/drawing/2010/main">
+                <a:solidFill>
+                  <a:srgbClr val="FFFFFF"/>
+                </a:solidFill>
+              </a14:hiddenFill>
+            </a:ext>
+            <a:ext uri="{91240B29-F687-4F45-9708-019B960494DF}">
+              <a14:hiddenLine xmlns:a14="http://schemas.microsoft.com/office/drawing/2010/main" w="9525">
+                <a:solidFill>
+                  <a:srgbClr val="000000"/>
+                </a:solidFill>
+                <a:miter lim="800000"/>
+                <a:headEnd/>
+                <a:tailEnd/>
+              </a14:hiddenLine>
+            </a:ext>
+          </a:extLst>
+        </p:spPr>
+        <p:txBody>
+          <a:bodyPr vert="horz" wrap="none" lIns="0" tIns="0" rIns="0" bIns="0" numCol="1" anchor="t" anchorCtr="0" compatLnSpc="1">
+            <a:prstTxWarp prst="textNoShape">
+              <a:avLst/>
+            </a:prstTxWarp>
+            <a:spAutoFit/>
+          </a:bodyPr>
+          <a:lstStyle>
+            <a:lvl1pPr eaLnBrk="0" fontAlgn="base" hangingPunct="0">
+              <a:spcBef>
+                <a:spcPct val="0"/>
+              </a:spcBef>
+              <a:spcAft>
+                <a:spcPct val="0"/>
+              </a:spcAft>
+              <a:defRPr>
+                <a:solidFill>
+                  <a:schemeClr val="tx1"/>
+                </a:solidFill>
+                <a:latin typeface="Arial" panose="020B0604020202020204" pitchFamily="34" charset="0"/>
+              </a:defRPr>
+            </a:lvl1pPr>
+            <a:lvl2pPr eaLnBrk="0" fontAlgn="base" hangingPunct="0">
+              <a:spcBef>
+                <a:spcPct val="0"/>
+              </a:spcBef>
+              <a:spcAft>
+                <a:spcPct val="0"/>
+              </a:spcAft>
+              <a:defRPr>
+                <a:solidFill>
+                  <a:schemeClr val="tx1"/>
+                </a:solidFill>
+                <a:latin typeface="Arial" panose="020B0604020202020204" pitchFamily="34" charset="0"/>
+              </a:defRPr>
+            </a:lvl2pPr>
+            <a:lvl3pPr eaLnBrk="0" fontAlgn="base" hangingPunct="0">
+              <a:spcBef>
+                <a:spcPct val="0"/>
+              </a:spcBef>
+              <a:spcAft>
+                <a:spcPct val="0"/>
+              </a:spcAft>
+              <a:defRPr>
+                <a:solidFill>
+                  <a:schemeClr val="tx1"/>
+                </a:solidFill>
+                <a:latin typeface="Arial" panose="020B0604020202020204" pitchFamily="34" charset="0"/>
+              </a:defRPr>
+            </a:lvl3pPr>
+            <a:lvl4pPr eaLnBrk="0" fontAlgn="base" hangingPunct="0">
+              <a:spcBef>
+                <a:spcPct val="0"/>
+              </a:spcBef>
+              <a:spcAft>
+                <a:spcPct val="0"/>
+              </a:spcAft>
+              <a:defRPr>
+                <a:solidFill>
+                  <a:schemeClr val="tx1"/>
+                </a:solidFill>
+                <a:latin typeface="Arial" panose="020B0604020202020204" pitchFamily="34" charset="0"/>
+              </a:defRPr>
+            </a:lvl4pPr>
+            <a:lvl5pPr eaLnBrk="0" fontAlgn="base" hangingPunct="0">
+              <a:spcBef>
+                <a:spcPct val="0"/>
+              </a:spcBef>
+              <a:spcAft>
+                <a:spcPct val="0"/>
+              </a:spcAft>
+              <a:defRPr>
+                <a:solidFill>
+                  <a:schemeClr val="tx1"/>
+                </a:solidFill>
+                <a:latin typeface="Arial" panose="020B0604020202020204" pitchFamily="34" charset="0"/>
+              </a:defRPr>
+            </a:lvl5pPr>
+            <a:lvl6pPr eaLnBrk="0" fontAlgn="base" hangingPunct="0">
+              <a:spcBef>
+                <a:spcPct val="0"/>
+              </a:spcBef>
+              <a:spcAft>
+                <a:spcPct val="0"/>
+              </a:spcAft>
+              <a:defRPr>
+                <a:solidFill>
+                  <a:schemeClr val="tx1"/>
+                </a:solidFill>
+                <a:latin typeface="Arial" panose="020B0604020202020204" pitchFamily="34" charset="0"/>
+              </a:defRPr>
+            </a:lvl6pPr>
+            <a:lvl7pPr eaLnBrk="0" fontAlgn="base" hangingPunct="0">
+              <a:spcBef>
+                <a:spcPct val="0"/>
+              </a:spcBef>
+              <a:spcAft>
+                <a:spcPct val="0"/>
+              </a:spcAft>
+              <a:defRPr>
+                <a:solidFill>
+                  <a:schemeClr val="tx1"/>
+                </a:solidFill>
+                <a:latin typeface="Arial" panose="020B0604020202020204" pitchFamily="34" charset="0"/>
+              </a:defRPr>
+            </a:lvl7pPr>
+            <a:lvl8pPr eaLnBrk="0" fontAlgn="base" hangingPunct="0">
+              <a:spcBef>
+                <a:spcPct val="0"/>
+              </a:spcBef>
+              <a:spcAft>
+                <a:spcPct val="0"/>
+              </a:spcAft>
+              <a:defRPr>
+                <a:solidFill>
+                  <a:schemeClr val="tx1"/>
+                </a:solidFill>
+                <a:latin typeface="Arial" panose="020B0604020202020204" pitchFamily="34" charset="0"/>
+              </a:defRPr>
+            </a:lvl8pPr>
+            <a:lvl9pPr eaLnBrk="0" fontAlgn="base" hangingPunct="0">
+              <a:spcBef>
+                <a:spcPct val="0"/>
+              </a:spcBef>
+              <a:spcAft>
+                <a:spcPct val="0"/>
+              </a:spcAft>
+              <a:defRPr>
+                <a:solidFill>
+                  <a:schemeClr val="tx1"/>
+                </a:solidFill>
+                <a:latin typeface="Arial" panose="020B0604020202020204" pitchFamily="34" charset="0"/>
+              </a:defRPr>
+            </a:lvl9pPr>
+          </a:lstStyle>
+          <a:p>
+            <a:pPr algn="ctr">
+              <a:defRPr/>
+            </a:pPr>
+            <a:r>
+              <a:rPr lang="zh-CN" altLang="en-US" sz="1100" kern="0" dirty="0">
+                <a:solidFill>
+                  <a:srgbClr val="000000"/>
+                </a:solidFill>
+                <a:ea typeface="等线" panose="02010600030101010101" pitchFamily="2" charset="-122"/>
+                <a:cs typeface="Arial" panose="020B0604020202020204" pitchFamily="34" charset="0"/>
+              </a:rPr>
+              <a:t>收集测点数据</a:t>
+            </a:r>
+            <a:endParaRPr lang="zh-CN" altLang="zh-CN" sz="1100" kern="0" dirty="0">
+              <a:solidFill>
+                <a:srgbClr val="000000"/>
+              </a:solidFill>
+              <a:ea typeface="等线" panose="02010600030101010101" pitchFamily="2" charset="-122"/>
+              <a:cs typeface="Arial" panose="020B0604020202020204" pitchFamily="34" charset="0"/>
+            </a:endParaRPr>
+          </a:p>
+        </p:txBody>
+      </p:sp>
+      <p:sp>
+        <p:nvSpPr>
+          <p:cNvPr id="34" name="TextBox 10">
+            <a:extLst>
+              <a:ext uri="{FF2B5EF4-FFF2-40B4-BE49-F238E27FC236}">
+                <a16:creationId xmlns:a16="http://schemas.microsoft.com/office/drawing/2014/main" id="{EE815C26-65C8-4797-9835-409DE97E8739}"/>
+              </a:ext>
+            </a:extLst>
+          </p:cNvPr>
+          <p:cNvSpPr txBox="1"/>
+          <p:nvPr/>
+        </p:nvSpPr>
+        <p:spPr>
+          <a:xfrm>
+            <a:off x="621357" y="281560"/>
+            <a:ext cx="1915861" cy="307777"/>
+          </a:xfrm>
+          <a:prstGeom prst="rect">
+            <a:avLst/>
+          </a:prstGeom>
+          <a:noFill/>
+        </p:spPr>
+        <p:txBody>
+          <a:bodyPr wrap="square" rtlCol="0">
+            <a:spAutoFit/>
+          </a:bodyPr>
+          <a:lstStyle/>
+          <a:p>
+            <a:pPr>
+              <a:defRPr/>
+            </a:pPr>
+            <a:r>
+              <a:rPr lang="en-US" sz="1400" dirty="0">
+                <a:solidFill>
+                  <a:srgbClr val="182135"/>
+                </a:solidFill>
+                <a:ea typeface="Arial" charset="0"/>
+                <a:cs typeface="Arial" charset="0"/>
+              </a:rPr>
+              <a:t>tutorial_blueprint.png</a:t>
+            </a:r>
+          </a:p>
+        </p:txBody>
+      </p:sp>
+    </p:spTree>
+    <p:extLst>
+      <p:ext uri="{BB962C8B-B14F-4D97-AF65-F5344CB8AC3E}">
+        <p14:creationId xmlns:p14="http://schemas.microsoft.com/office/powerpoint/2010/main" val="3168806085"/>
+      </p:ext>
+    </p:extLst>
+  </p:cSld>
+  <p:clrMapOvr>
+    <a:masterClrMapping/>
+  </p:clrMapOvr>
+</p:sld>
+</file>
+
 <file path=ppt/theme/theme1.xml><?xml version="1.0" encoding="utf-8"?>
 <a:theme xmlns:a="http://schemas.openxmlformats.org/drawingml/2006/main" name="1_自定义设计方案">
   <a:themeElements>

</xml_diff>